<commit_message>
Lightened section colors and darked headings
</commit_message>
<xml_diff>
--- a/CMU REUSE 2017 Poster.pptx
+++ b/CMU REUSE 2017 Poster.pptx
@@ -3999,6 +3999,102 @@
           <a:chExt cx="0" cy="0"/>
         </a:xfrm>
       </p:grpSpPr>
+      <p:sp>
+        <p:nvSpPr>
+          <p:cNvPr id="93" name="Isosceles Triangle 92"/>
+          <p:cNvSpPr/>
+          <p:nvPr/>
+        </p:nvSpPr>
+        <p:spPr>
+          <a:xfrm rot="2552075">
+            <a:off x="20570391" y="3481112"/>
+            <a:ext cx="12514568" cy="12619929"/>
+          </a:xfrm>
+          <a:prstGeom prst="triangle">
+            <a:avLst/>
+          </a:prstGeom>
+          <a:solidFill>
+            <a:schemeClr val="accent1">
+              <a:alpha val="13000"/>
+            </a:schemeClr>
+          </a:solidFill>
+          <a:ln>
+            <a:noFill/>
+          </a:ln>
+        </p:spPr>
+        <p:style>
+          <a:lnRef idx="2">
+            <a:schemeClr val="accent1">
+              <a:shade val="50000"/>
+            </a:schemeClr>
+          </a:lnRef>
+          <a:fillRef idx="1">
+            <a:schemeClr val="accent1"/>
+          </a:fillRef>
+          <a:effectRef idx="0">
+            <a:schemeClr val="accent1"/>
+          </a:effectRef>
+          <a:fontRef idx="minor">
+            <a:schemeClr val="lt1"/>
+          </a:fontRef>
+        </p:style>
+        <p:txBody>
+          <a:bodyPr rtlCol="0" anchor="ctr"/>
+          <a:lstStyle/>
+          <a:p>
+            <a:pPr algn="ctr"/>
+            <a:endParaRPr lang="en-US"/>
+          </a:p>
+        </p:txBody>
+      </p:sp>
+      <p:sp>
+        <p:nvSpPr>
+          <p:cNvPr id="94" name="Pentagon 93"/>
+          <p:cNvSpPr/>
+          <p:nvPr/>
+        </p:nvSpPr>
+        <p:spPr>
+          <a:xfrm rot="1686696">
+            <a:off x="18341154" y="4949140"/>
+            <a:ext cx="13819609" cy="11228327"/>
+          </a:xfrm>
+          <a:prstGeom prst="pentagon">
+            <a:avLst/>
+          </a:prstGeom>
+          <a:solidFill>
+            <a:schemeClr val="accent1">
+              <a:alpha val="10000"/>
+            </a:schemeClr>
+          </a:solidFill>
+          <a:ln>
+            <a:noFill/>
+          </a:ln>
+        </p:spPr>
+        <p:style>
+          <a:lnRef idx="2">
+            <a:schemeClr val="accent1">
+              <a:shade val="50000"/>
+            </a:schemeClr>
+          </a:lnRef>
+          <a:fillRef idx="1">
+            <a:schemeClr val="accent1"/>
+          </a:fillRef>
+          <a:effectRef idx="0">
+            <a:schemeClr val="accent1"/>
+          </a:effectRef>
+          <a:fontRef idx="minor">
+            <a:schemeClr val="lt1"/>
+          </a:fontRef>
+        </p:style>
+        <p:txBody>
+          <a:bodyPr rtlCol="0" anchor="ctr"/>
+          <a:lstStyle/>
+          <a:p>
+            <a:pPr algn="ctr"/>
+            <a:endParaRPr lang="en-US" dirty="0"/>
+          </a:p>
+        </p:txBody>
+      </p:sp>
       <p:sp>
         <p:nvSpPr>
           <p:cNvPr id="79" name="Explosion: 8 Points 78"/>
@@ -5194,7 +5290,9 @@
               </a:avLst>
             </a:prstGeom>
             <a:solidFill>
-              <a:srgbClr val="EEDD96"/>
+              <a:srgbClr val="EEDD96">
+                <a:alpha val="75000"/>
+              </a:srgbClr>
             </a:solidFill>
             <a:ln>
               <a:noFill/>
@@ -5240,7 +5338,9 @@
               <a:avLst/>
             </a:prstGeom>
             <a:solidFill>
-              <a:srgbClr val="BFBFBF"/>
+              <a:schemeClr val="bg1">
+                <a:lumMod val="65000"/>
+              </a:schemeClr>
             </a:solidFill>
             <a:ln>
               <a:noFill/>
@@ -5267,7 +5367,10 @@
             <a:lstStyle/>
             <a:p>
               <a:pPr algn="ctr"/>
-              <a:endParaRPr lang="en-US"/>
+              <a:r>
+                <a:rPr lang="en-US" dirty="0"/>
+                <a:t>f</a:t>
+              </a:r>
             </a:p>
           </p:txBody>
         </p:sp>
@@ -5286,7 +5389,9 @@
               <a:avLst/>
             </a:prstGeom>
             <a:solidFill>
-              <a:srgbClr val="BFBFBF"/>
+              <a:schemeClr val="bg1">
+                <a:lumMod val="65000"/>
+              </a:schemeClr>
             </a:solidFill>
           </p:spPr>
           <p:txBody>
@@ -5340,7 +5445,9 @@
               </a:avLst>
             </a:prstGeom>
             <a:solidFill>
-              <a:srgbClr val="7D99A7"/>
+              <a:srgbClr val="7D99A7">
+                <a:alpha val="75000"/>
+              </a:srgbClr>
             </a:solidFill>
             <a:ln>
               <a:noFill/>
@@ -5406,7 +5513,7 @@
               </a:prstGeom>
               <a:solidFill>
                 <a:schemeClr val="bg1">
-                  <a:lumMod val="75000"/>
+                  <a:lumMod val="65000"/>
                 </a:schemeClr>
               </a:solidFill>
               <a:ln>
@@ -5490,7 +5597,7 @@
           </a:prstGeom>
           <a:solidFill>
             <a:srgbClr val="CD6D6D">
-              <a:alpha val="10000"/>
+              <a:alpha val="13000"/>
             </a:srgbClr>
           </a:solidFill>
           <a:ln>
@@ -5748,7 +5855,7 @@
             </a:prstGeom>
             <a:solidFill>
               <a:schemeClr val="bg1">
-                <a:lumMod val="75000"/>
+                <a:lumMod val="65000"/>
               </a:schemeClr>
             </a:solidFill>
             <a:ln>
@@ -5798,7 +5905,7 @@
             </a:prstGeom>
             <a:solidFill>
               <a:schemeClr val="bg1">
-                <a:lumMod val="75000"/>
+                <a:lumMod val="65000"/>
               </a:schemeClr>
             </a:solidFill>
             <a:ln>
@@ -5868,7 +5975,7 @@
             </a:prstGeom>
             <a:solidFill>
               <a:schemeClr val="bg1">
-                <a:lumMod val="75000"/>
+                <a:lumMod val="65000"/>
               </a:schemeClr>
             </a:solidFill>
             <a:ln>
@@ -5918,7 +6025,7 @@
             </a:prstGeom>
             <a:solidFill>
               <a:schemeClr val="bg1">
-                <a:lumMod val="75000"/>
+                <a:lumMod val="65000"/>
               </a:schemeClr>
             </a:solidFill>
             <a:ln>

</xml_diff>

<commit_message>
Definitions: Module & CnC views
</commit_message>
<xml_diff>
--- a/CMU REUSE 2017 Poster.pptx
+++ b/CMU REUSE 2017 Poster.pptx
@@ -14,19 +14,26 @@
   <p:notesSz cx="6858000" cy="9144000"/>
   <p:embeddedFontLst>
     <p:embeddedFont>
-      <p:font typeface="Oswald"/>
+      <p:font typeface="Source Code Pro" panose="020B0604020202020204" charset="0"/>
       <p:regular r:id="rId4"/>
       <p:bold r:id="rId5"/>
     </p:embeddedFont>
     <p:embeddedFont>
-      <p:font typeface="Source Code Pro" panose="020B0604020202020204" charset="0"/>
+      <p:font typeface="Oxygen" panose="02000503000000000000" pitchFamily="2" charset="0"/>
       <p:regular r:id="rId6"/>
       <p:bold r:id="rId7"/>
     </p:embeddedFont>
     <p:embeddedFont>
-      <p:font typeface="Oxygen" panose="02000503000000000000" pitchFamily="2" charset="0"/>
+      <p:font typeface="Oswald"/>
       <p:regular r:id="rId8"/>
       <p:bold r:id="rId9"/>
+    </p:embeddedFont>
+    <p:embeddedFont>
+      <p:font typeface="Consolas" panose="020B0609020204030204" pitchFamily="49" charset="0"/>
+      <p:regular r:id="rId10"/>
+      <p:bold r:id="rId11"/>
+      <p:italic r:id="rId12"/>
+      <p:boldItalic r:id="rId13"/>
     </p:embeddedFont>
   </p:embeddedFontLst>
   <p:defaultTextStyle>
@@ -4103,7 +4110,7 @@
         </p:nvSpPr>
         <p:spPr>
           <a:xfrm>
-            <a:off x="-806393" y="4618130"/>
+            <a:off x="-1252673" y="6074764"/>
             <a:ext cx="11548770" cy="15647600"/>
           </a:xfrm>
           <a:prstGeom prst="irregularSeal1">
@@ -4139,7 +4146,7 @@
           <a:lstStyle/>
           <a:p>
             <a:pPr algn="ctr"/>
-            <a:endParaRPr lang="en-US"/>
+            <a:endParaRPr lang="en-US" dirty="0"/>
           </a:p>
         </p:txBody>
       </p:sp>
@@ -4173,680 +4180,6 @@
           </a:fontRef>
         </p:style>
       </p:cxnSp>
-      <p:grpSp>
-        <p:nvGrpSpPr>
-          <p:cNvPr id="29" name="Group 28"/>
-          <p:cNvGrpSpPr/>
-          <p:nvPr/>
-        </p:nvGrpSpPr>
-        <p:grpSpPr>
-          <a:xfrm>
-            <a:off x="11114259" y="8998719"/>
-            <a:ext cx="5944661" cy="8249571"/>
-            <a:chOff x="12160993" y="8496621"/>
-            <a:chExt cx="5944661" cy="8249571"/>
-          </a:xfrm>
-        </p:grpSpPr>
-        <p:sp>
-          <p:nvSpPr>
-            <p:cNvPr id="70" name="Shape 70"/>
-            <p:cNvSpPr/>
-            <p:nvPr/>
-          </p:nvSpPr>
-          <p:spPr>
-            <a:xfrm>
-              <a:off x="12160993" y="9778349"/>
-              <a:ext cx="5944661" cy="6967843"/>
-            </a:xfrm>
-            <a:prstGeom prst="flowChartMagneticDisk">
-              <a:avLst/>
-            </a:prstGeom>
-            <a:noFill/>
-            <a:ln w="38100" cap="flat" cmpd="sng">
-              <a:solidFill>
-                <a:srgbClr val="000000"/>
-              </a:solidFill>
-              <a:prstDash val="solid"/>
-              <a:round/>
-              <a:headEnd type="none" w="med" len="med"/>
-              <a:tailEnd type="none" w="med" len="med"/>
-            </a:ln>
-          </p:spPr>
-          <p:txBody>
-            <a:bodyPr lIns="91425" tIns="91425" rIns="91425" bIns="91425" anchor="ctr" anchorCtr="0">
-              <a:noAutofit/>
-            </a:bodyPr>
-            <a:lstStyle/>
-            <a:p>
-              <a:pPr lvl="0">
-                <a:spcBef>
-                  <a:spcPts val="0"/>
-                </a:spcBef>
-                <a:buNone/>
-              </a:pPr>
-              <a:endParaRPr/>
-            </a:p>
-          </p:txBody>
-        </p:sp>
-        <p:sp>
-          <p:nvSpPr>
-            <p:cNvPr id="25" name="TextBox 24"/>
-            <p:cNvSpPr txBox="1"/>
-            <p:nvPr/>
-          </p:nvSpPr>
-          <p:spPr>
-            <a:xfrm>
-              <a:off x="13225589" y="8496621"/>
-              <a:ext cx="3815468" cy="861774"/>
-            </a:xfrm>
-            <a:prstGeom prst="rect">
-              <a:avLst/>
-            </a:prstGeom>
-            <a:noFill/>
-          </p:spPr>
-          <p:txBody>
-            <a:bodyPr wrap="none" rtlCol="0">
-              <a:spAutoFit/>
-            </a:bodyPr>
-            <a:lstStyle/>
-            <a:p>
-              <a:r>
-                <a:rPr lang="en-US" sz="5000" dirty="0">
-                  <a:latin typeface="Oxygen" panose="02000503000000000000" pitchFamily="2" charset="0"/>
-                </a:rPr>
-                <a:t>The Problem</a:t>
-              </a:r>
-            </a:p>
-          </p:txBody>
-        </p:sp>
-        <p:sp>
-          <p:nvSpPr>
-            <p:cNvPr id="28" name="TextBox 27"/>
-            <p:cNvSpPr txBox="1"/>
-            <p:nvPr/>
-          </p:nvSpPr>
-          <p:spPr>
-            <a:xfrm>
-              <a:off x="12547735" y="12805877"/>
-              <a:ext cx="5171176" cy="1938992"/>
-            </a:xfrm>
-            <a:prstGeom prst="rect">
-              <a:avLst/>
-            </a:prstGeom>
-            <a:noFill/>
-          </p:spPr>
-          <p:txBody>
-            <a:bodyPr wrap="square" rtlCol="0">
-              <a:spAutoFit/>
-            </a:bodyPr>
-            <a:lstStyle/>
-            <a:p>
-              <a:pPr algn="ctr"/>
-              <a:r>
-                <a:rPr lang="en-US" sz="3000" dirty="0">
-                  <a:latin typeface="Oxygen" panose="02000503000000000000" pitchFamily="2" charset="0"/>
-                </a:rPr>
-                <a:t>Guarantees planned in software architecture design do not always carry through to implementations.</a:t>
-              </a:r>
-            </a:p>
-          </p:txBody>
-        </p:sp>
-      </p:grpSp>
-      <p:grpSp>
-        <p:nvGrpSpPr>
-          <p:cNvPr id="41" name="Group 40"/>
-          <p:cNvGrpSpPr/>
-          <p:nvPr/>
-        </p:nvGrpSpPr>
-        <p:grpSpPr>
-          <a:xfrm>
-            <a:off x="413182" y="6690571"/>
-            <a:ext cx="10314334" cy="13010049"/>
-            <a:chOff x="1459917" y="6136769"/>
-            <a:chExt cx="10314334" cy="13010049"/>
-          </a:xfrm>
-        </p:grpSpPr>
-        <p:grpSp>
-          <p:nvGrpSpPr>
-            <p:cNvPr id="24" name="Group 23"/>
-            <p:cNvGrpSpPr/>
-            <p:nvPr/>
-          </p:nvGrpSpPr>
-          <p:grpSpPr>
-            <a:xfrm>
-              <a:off x="1459917" y="6136769"/>
-              <a:ext cx="7882010" cy="13010049"/>
-              <a:chOff x="1349414" y="5959861"/>
-              <a:chExt cx="7882010" cy="13010049"/>
-            </a:xfrm>
-          </p:grpSpPr>
-          <p:grpSp>
-            <p:nvGrpSpPr>
-              <p:cNvPr id="23" name="Group 22"/>
-              <p:cNvGrpSpPr/>
-              <p:nvPr/>
-            </p:nvGrpSpPr>
-            <p:grpSpPr>
-              <a:xfrm>
-                <a:off x="1349414" y="5959861"/>
-                <a:ext cx="7882010" cy="13010049"/>
-                <a:chOff x="1349414" y="5959861"/>
-                <a:chExt cx="7882010" cy="13010049"/>
-              </a:xfrm>
-            </p:grpSpPr>
-            <p:grpSp>
-              <p:nvGrpSpPr>
-                <p:cNvPr id="18" name="Group 17"/>
-                <p:cNvGrpSpPr/>
-                <p:nvPr/>
-              </p:nvGrpSpPr>
-              <p:grpSpPr>
-                <a:xfrm>
-                  <a:off x="2538536" y="5959861"/>
-                  <a:ext cx="6692888" cy="13010049"/>
-                  <a:chOff x="3325408" y="5804822"/>
-                  <a:chExt cx="6692888" cy="13010049"/>
-                </a:xfrm>
-              </p:grpSpPr>
-              <p:grpSp>
-                <p:nvGrpSpPr>
-                  <p:cNvPr id="17" name="Group 16"/>
-                  <p:cNvGrpSpPr/>
-                  <p:nvPr/>
-                </p:nvGrpSpPr>
-                <p:grpSpPr>
-                  <a:xfrm>
-                    <a:off x="3325408" y="5804822"/>
-                    <a:ext cx="6692888" cy="13010049"/>
-                    <a:chOff x="3325408" y="5804822"/>
-                    <a:chExt cx="6692888" cy="13010049"/>
-                  </a:xfrm>
-                </p:grpSpPr>
-                <p:grpSp>
-                  <p:nvGrpSpPr>
-                    <p:cNvPr id="5" name="Group 4"/>
-                    <p:cNvGrpSpPr/>
-                    <p:nvPr/>
-                  </p:nvGrpSpPr>
-                  <p:grpSpPr>
-                    <a:xfrm>
-                      <a:off x="3325408" y="5804822"/>
-                      <a:ext cx="5383840" cy="13010049"/>
-                      <a:chOff x="3325408" y="5804822"/>
-                      <a:chExt cx="5383840" cy="13010049"/>
-                    </a:xfrm>
-                  </p:grpSpPr>
-                  <p:sp>
-                    <p:nvSpPr>
-                      <p:cNvPr id="2" name="Rectangle 1"/>
-                      <p:cNvSpPr/>
-                      <p:nvPr/>
-                    </p:nvSpPr>
-                    <p:spPr>
-                      <a:xfrm>
-                        <a:off x="3325409" y="5804822"/>
-                        <a:ext cx="5383839" cy="3639460"/>
-                      </a:xfrm>
-                      <a:prstGeom prst="rect">
-                        <a:avLst/>
-                      </a:prstGeom>
-                      <a:noFill/>
-                      <a:ln cmpd="sng">
-                        <a:solidFill>
-                          <a:schemeClr val="tx2">
-                            <a:lumMod val="50000"/>
-                          </a:schemeClr>
-                        </a:solidFill>
-                        <a:prstDash val="solid"/>
-                        <a:round/>
-                      </a:ln>
-                    </p:spPr>
-                    <p:style>
-                      <a:lnRef idx="2">
-                        <a:schemeClr val="accent1">
-                          <a:shade val="50000"/>
-                        </a:schemeClr>
-                      </a:lnRef>
-                      <a:fillRef idx="1">
-                        <a:schemeClr val="accent1"/>
-                      </a:fillRef>
-                      <a:effectRef idx="0">
-                        <a:schemeClr val="accent1"/>
-                      </a:effectRef>
-                      <a:fontRef idx="minor">
-                        <a:schemeClr val="lt1"/>
-                      </a:fontRef>
-                    </p:style>
-                    <p:txBody>
-                      <a:bodyPr rtlCol="0" anchor="ctr"/>
-                      <a:lstStyle/>
-                      <a:p>
-                        <a:pPr algn="ctr"/>
-                        <a:endParaRPr lang="en-US" dirty="0"/>
-                      </a:p>
-                    </p:txBody>
-                  </p:sp>
-                  <p:sp>
-                    <p:nvSpPr>
-                      <p:cNvPr id="12" name="Rectangle 11"/>
-                      <p:cNvSpPr/>
-                      <p:nvPr/>
-                    </p:nvSpPr>
-                    <p:spPr>
-                      <a:xfrm>
-                        <a:off x="3325408" y="10443536"/>
-                        <a:ext cx="5383839" cy="3639460"/>
-                      </a:xfrm>
-                      <a:prstGeom prst="rect">
-                        <a:avLst/>
-                      </a:prstGeom>
-                      <a:noFill/>
-                      <a:ln cmpd="sng">
-                        <a:solidFill>
-                          <a:schemeClr val="tx2">
-                            <a:lumMod val="50000"/>
-                          </a:schemeClr>
-                        </a:solidFill>
-                        <a:prstDash val="solid"/>
-                        <a:round/>
-                      </a:ln>
-                    </p:spPr>
-                    <p:style>
-                      <a:lnRef idx="2">
-                        <a:schemeClr val="accent1">
-                          <a:shade val="50000"/>
-                        </a:schemeClr>
-                      </a:lnRef>
-                      <a:fillRef idx="1">
-                        <a:schemeClr val="accent1"/>
-                      </a:fillRef>
-                      <a:effectRef idx="0">
-                        <a:schemeClr val="accent1"/>
-                      </a:effectRef>
-                      <a:fontRef idx="minor">
-                        <a:schemeClr val="lt1"/>
-                      </a:fontRef>
-                    </p:style>
-                    <p:txBody>
-                      <a:bodyPr rtlCol="0" anchor="ctr"/>
-                      <a:lstStyle/>
-                      <a:p>
-                        <a:pPr algn="ctr"/>
-                        <a:endParaRPr lang="en-US"/>
-                      </a:p>
-                    </p:txBody>
-                  </p:sp>
-                  <p:sp>
-                    <p:nvSpPr>
-                      <p:cNvPr id="13" name="Rectangle 12"/>
-                      <p:cNvSpPr/>
-                      <p:nvPr/>
-                    </p:nvSpPr>
-                    <p:spPr>
-                      <a:xfrm>
-                        <a:off x="3325408" y="15175411"/>
-                        <a:ext cx="5383839" cy="3639460"/>
-                      </a:xfrm>
-                      <a:prstGeom prst="rect">
-                        <a:avLst/>
-                      </a:prstGeom>
-                      <a:noFill/>
-                      <a:ln cmpd="sng">
-                        <a:solidFill>
-                          <a:schemeClr val="tx2">
-                            <a:lumMod val="50000"/>
-                          </a:schemeClr>
-                        </a:solidFill>
-                        <a:prstDash val="solid"/>
-                        <a:round/>
-                      </a:ln>
-                    </p:spPr>
-                    <p:style>
-                      <a:lnRef idx="2">
-                        <a:schemeClr val="accent1">
-                          <a:shade val="50000"/>
-                        </a:schemeClr>
-                      </a:lnRef>
-                      <a:fillRef idx="1">
-                        <a:schemeClr val="accent1"/>
-                      </a:fillRef>
-                      <a:effectRef idx="0">
-                        <a:schemeClr val="accent1"/>
-                      </a:effectRef>
-                      <a:fontRef idx="minor">
-                        <a:schemeClr val="lt1"/>
-                      </a:fontRef>
-                    </p:style>
-                    <p:txBody>
-                      <a:bodyPr rtlCol="0" anchor="ctr"/>
-                      <a:lstStyle/>
-                      <a:p>
-                        <a:pPr algn="ctr"/>
-                        <a:endParaRPr lang="en-US"/>
-                      </a:p>
-                    </p:txBody>
-                  </p:sp>
-                </p:grpSp>
-                <p:grpSp>
-                  <p:nvGrpSpPr>
-                    <p:cNvPr id="16" name="Group 15"/>
-                    <p:cNvGrpSpPr/>
-                    <p:nvPr/>
-                  </p:nvGrpSpPr>
-                  <p:grpSpPr>
-                    <a:xfrm>
-                      <a:off x="8709248" y="7624552"/>
-                      <a:ext cx="1309048" cy="9344526"/>
-                      <a:chOff x="8709248" y="7624552"/>
-                      <a:chExt cx="1309048" cy="9344526"/>
-                    </a:xfrm>
-                  </p:grpSpPr>
-                  <p:cxnSp>
-                    <p:nvCxnSpPr>
-                      <p:cNvPr id="9" name="Straight Connector 8"/>
-                      <p:cNvCxnSpPr>
-                        <a:stCxn id="2" idx="3"/>
-                      </p:cNvCxnSpPr>
-                      <p:nvPr/>
-                    </p:nvCxnSpPr>
-                    <p:spPr>
-                      <a:xfrm>
-                        <a:off x="8709248" y="7624552"/>
-                        <a:ext cx="1301026" cy="0"/>
-                      </a:xfrm>
-                      <a:prstGeom prst="line">
-                        <a:avLst/>
-                      </a:prstGeom>
-                      <a:ln w="63500" cmpd="sng">
-                        <a:solidFill>
-                          <a:schemeClr val="tx2">
-                            <a:lumMod val="50000"/>
-                          </a:schemeClr>
-                        </a:solidFill>
-                        <a:prstDash val="solid"/>
-                        <a:round/>
-                      </a:ln>
-                    </p:spPr>
-                    <p:style>
-                      <a:lnRef idx="3">
-                        <a:schemeClr val="accent1"/>
-                      </a:lnRef>
-                      <a:fillRef idx="0">
-                        <a:schemeClr val="accent1"/>
-                      </a:fillRef>
-                      <a:effectRef idx="2">
-                        <a:schemeClr val="accent1"/>
-                      </a:effectRef>
-                      <a:fontRef idx="minor">
-                        <a:schemeClr val="tx1"/>
-                      </a:fontRef>
-                    </p:style>
-                  </p:cxnSp>
-                  <p:cxnSp>
-                    <p:nvCxnSpPr>
-                      <p:cNvPr id="21" name="Straight Connector 20"/>
-                      <p:cNvCxnSpPr/>
-                      <p:nvPr/>
-                    </p:nvCxnSpPr>
-                    <p:spPr>
-                      <a:xfrm>
-                        <a:off x="8716462" y="12272382"/>
-                        <a:ext cx="1301026" cy="0"/>
-                      </a:xfrm>
-                      <a:prstGeom prst="line">
-                        <a:avLst/>
-                      </a:prstGeom>
-                      <a:ln w="63500" cmpd="sng">
-                        <a:solidFill>
-                          <a:schemeClr val="tx2">
-                            <a:lumMod val="50000"/>
-                          </a:schemeClr>
-                        </a:solidFill>
-                        <a:prstDash val="solid"/>
-                        <a:round/>
-                      </a:ln>
-                    </p:spPr>
-                    <p:style>
-                      <a:lnRef idx="3">
-                        <a:schemeClr val="accent1"/>
-                      </a:lnRef>
-                      <a:fillRef idx="0">
-                        <a:schemeClr val="accent1"/>
-                      </a:fillRef>
-                      <a:effectRef idx="2">
-                        <a:schemeClr val="accent1"/>
-                      </a:effectRef>
-                      <a:fontRef idx="minor">
-                        <a:schemeClr val="tx1"/>
-                      </a:fontRef>
-                    </p:style>
-                  </p:cxnSp>
-                  <p:cxnSp>
-                    <p:nvCxnSpPr>
-                      <p:cNvPr id="22" name="Straight Connector 21"/>
-                      <p:cNvCxnSpPr/>
-                      <p:nvPr/>
-                    </p:nvCxnSpPr>
-                    <p:spPr>
-                      <a:xfrm>
-                        <a:off x="8717270" y="16969078"/>
-                        <a:ext cx="1301026" cy="0"/>
-                      </a:xfrm>
-                      <a:prstGeom prst="line">
-                        <a:avLst/>
-                      </a:prstGeom>
-                      <a:ln w="63500" cmpd="sng">
-                        <a:solidFill>
-                          <a:schemeClr val="tx2">
-                            <a:lumMod val="50000"/>
-                          </a:schemeClr>
-                        </a:solidFill>
-                        <a:prstDash val="solid"/>
-                        <a:round/>
-                      </a:ln>
-                    </p:spPr>
-                    <p:style>
-                      <a:lnRef idx="3">
-                        <a:schemeClr val="accent1"/>
-                      </a:lnRef>
-                      <a:fillRef idx="0">
-                        <a:schemeClr val="accent1"/>
-                      </a:fillRef>
-                      <a:effectRef idx="2">
-                        <a:schemeClr val="accent1"/>
-                      </a:effectRef>
-                      <a:fontRef idx="minor">
-                        <a:schemeClr val="tx1"/>
-                      </a:fontRef>
-                    </p:style>
-                  </p:cxnSp>
-                </p:grpSp>
-              </p:grpSp>
-              <p:cxnSp>
-                <p:nvCxnSpPr>
-                  <p:cNvPr id="15" name="Straight Connector 14"/>
-                  <p:cNvCxnSpPr/>
-                  <p:nvPr/>
-                </p:nvCxnSpPr>
-                <p:spPr>
-                  <a:xfrm flipH="1">
-                    <a:off x="10010274" y="7624552"/>
-                    <a:ext cx="8022" cy="9370589"/>
-                  </a:xfrm>
-                  <a:prstGeom prst="line">
-                    <a:avLst/>
-                  </a:prstGeom>
-                  <a:ln w="63500" cmpd="sng">
-                    <a:solidFill>
-                      <a:schemeClr val="tx2">
-                        <a:lumMod val="50000"/>
-                      </a:schemeClr>
-                    </a:solidFill>
-                    <a:prstDash val="solid"/>
-                    <a:round/>
-                  </a:ln>
-                </p:spPr>
-                <p:style>
-                  <a:lnRef idx="1">
-                    <a:schemeClr val="accent1"/>
-                  </a:lnRef>
-                  <a:fillRef idx="0">
-                    <a:schemeClr val="accent1"/>
-                  </a:fillRef>
-                  <a:effectRef idx="0">
-                    <a:schemeClr val="accent1"/>
-                  </a:effectRef>
-                  <a:fontRef idx="minor">
-                    <a:schemeClr val="tx1"/>
-                  </a:fontRef>
-                </p:style>
-              </p:cxnSp>
-            </p:grpSp>
-            <p:sp>
-              <p:nvSpPr>
-                <p:cNvPr id="20" name="TextBox 19"/>
-                <p:cNvSpPr txBox="1"/>
-                <p:nvPr/>
-              </p:nvSpPr>
-              <p:spPr>
-                <a:xfrm rot="16200000">
-                  <a:off x="1123331" y="7456425"/>
-                  <a:ext cx="1960271" cy="646331"/>
-                </a:xfrm>
-                <a:prstGeom prst="rect">
-                  <a:avLst/>
-                </a:prstGeom>
-                <a:noFill/>
-              </p:spPr>
-              <p:txBody>
-                <a:bodyPr wrap="square" rtlCol="0">
-                  <a:spAutoFit/>
-                </a:bodyPr>
-                <a:lstStyle/>
-                <a:p>
-                  <a:r>
-                    <a:rPr lang="en-US" sz="3600" dirty="0">
-                      <a:latin typeface="Oxygen" panose="02000503000000000000" pitchFamily="2" charset="0"/>
-                    </a:rPr>
-                    <a:t>Module</a:t>
-                  </a:r>
-                </a:p>
-              </p:txBody>
-            </p:sp>
-            <p:sp>
-              <p:nvSpPr>
-                <p:cNvPr id="30" name="TextBox 29"/>
-                <p:cNvSpPr txBox="1"/>
-                <p:nvPr/>
-              </p:nvSpPr>
-              <p:spPr>
-                <a:xfrm rot="16200000">
-                  <a:off x="413198" y="11879696"/>
-                  <a:ext cx="2949650" cy="1077218"/>
-                </a:xfrm>
-                <a:prstGeom prst="rect">
-                  <a:avLst/>
-                </a:prstGeom>
-                <a:noFill/>
-              </p:spPr>
-              <p:txBody>
-                <a:bodyPr wrap="square" rtlCol="0">
-                  <a:spAutoFit/>
-                </a:bodyPr>
-                <a:lstStyle/>
-                <a:p>
-                  <a:r>
-                    <a:rPr lang="en-US" sz="3200" dirty="0">
-                      <a:latin typeface="Oxygen" panose="02000503000000000000" pitchFamily="2" charset="0"/>
-                    </a:rPr>
-                    <a:t>Component </a:t>
-                  </a:r>
-                </a:p>
-                <a:p>
-                  <a:r>
-                    <a:rPr lang="en-US" sz="3200" dirty="0">
-                      <a:latin typeface="Oxygen" panose="02000503000000000000" pitchFamily="2" charset="0"/>
-                    </a:rPr>
-                    <a:t>and Connector</a:t>
-                  </a:r>
-                </a:p>
-              </p:txBody>
-            </p:sp>
-          </p:grpSp>
-          <p:sp>
-            <p:nvSpPr>
-              <p:cNvPr id="33" name="TextBox 32"/>
-              <p:cNvSpPr txBox="1"/>
-              <p:nvPr/>
-            </p:nvSpPr>
-            <p:spPr>
-              <a:xfrm rot="16200000">
-                <a:off x="766891" y="16842403"/>
-                <a:ext cx="2703930" cy="615553"/>
-              </a:xfrm>
-              <a:prstGeom prst="rect">
-                <a:avLst/>
-              </a:prstGeom>
-              <a:noFill/>
-            </p:spPr>
-            <p:txBody>
-              <a:bodyPr wrap="square" rtlCol="0">
-                <a:spAutoFit/>
-              </a:bodyPr>
-              <a:lstStyle/>
-              <a:p>
-                <a:r>
-                  <a:rPr lang="en-US" sz="3400" dirty="0">
-                    <a:latin typeface="Oxygen" panose="02000503000000000000" pitchFamily="2" charset="0"/>
-                  </a:rPr>
-                  <a:t>Deployment</a:t>
-                </a:r>
-              </a:p>
-            </p:txBody>
-          </p:sp>
-        </p:grpSp>
-        <p:cxnSp>
-          <p:nvCxnSpPr>
-            <p:cNvPr id="38" name="Straight Arrow Connector 37"/>
-            <p:cNvCxnSpPr/>
-            <p:nvPr/>
-          </p:nvCxnSpPr>
-          <p:spPr>
-            <a:xfrm>
-              <a:off x="9348334" y="12604329"/>
-              <a:ext cx="2425917" cy="0"/>
-            </a:xfrm>
-            <a:prstGeom prst="straightConnector1">
-              <a:avLst/>
-            </a:prstGeom>
-            <a:ln w="63500" cmpd="sng">
-              <a:solidFill>
-                <a:schemeClr val="tx2">
-                  <a:lumMod val="50000"/>
-                </a:schemeClr>
-              </a:solidFill>
-              <a:prstDash val="solid"/>
-              <a:round/>
-              <a:headEnd type="none"/>
-              <a:tailEnd type="stealth" w="lg" len="lg"/>
-            </a:ln>
-          </p:spPr>
-          <p:style>
-            <a:lnRef idx="1">
-              <a:schemeClr val="accent1"/>
-            </a:lnRef>
-            <a:fillRef idx="0">
-              <a:schemeClr val="accent1"/>
-            </a:fillRef>
-            <a:effectRef idx="0">
-              <a:schemeClr val="accent1"/>
-            </a:effectRef>
-            <a:fontRef idx="minor">
-              <a:schemeClr val="tx1"/>
-            </a:fontRef>
-          </p:style>
-        </p:cxnSp>
-      </p:grpSp>
       <p:grpSp>
         <p:nvGrpSpPr>
           <p:cNvPr id="63" name="Group 62"/>
@@ -5258,71 +4591,71 @@
           </p:sp>
         </p:grpSp>
       </p:grpSp>
+      <p:sp>
+        <p:nvSpPr>
+          <p:cNvPr id="75" name="Speech Bubble: Rectangle 74"/>
+          <p:cNvSpPr/>
+          <p:nvPr/>
+        </p:nvSpPr>
+        <p:spPr>
+          <a:xfrm rot="10800000">
+            <a:off x="0" y="20608742"/>
+            <a:ext cx="30262996" cy="11439628"/>
+          </a:xfrm>
+          <a:prstGeom prst="wedgeRectCallout">
+            <a:avLst>
+              <a:gd name="adj1" fmla="val -33287"/>
+              <a:gd name="adj2" fmla="val 69533"/>
+            </a:avLst>
+          </a:prstGeom>
+          <a:solidFill>
+            <a:srgbClr val="EEDD96">
+              <a:alpha val="75000"/>
+            </a:srgbClr>
+          </a:solidFill>
+          <a:ln>
+            <a:noFill/>
+          </a:ln>
+        </p:spPr>
+        <p:style>
+          <a:lnRef idx="2">
+            <a:schemeClr val="accent1">
+              <a:shade val="50000"/>
+            </a:schemeClr>
+          </a:lnRef>
+          <a:fillRef idx="1">
+            <a:schemeClr val="accent1"/>
+          </a:fillRef>
+          <a:effectRef idx="0">
+            <a:schemeClr val="accent1"/>
+          </a:effectRef>
+          <a:fontRef idx="minor">
+            <a:schemeClr val="lt1"/>
+          </a:fontRef>
+        </p:style>
+        <p:txBody>
+          <a:bodyPr rtlCol="0" anchor="ctr"/>
+          <a:lstStyle/>
+          <a:p>
+            <a:pPr algn="ctr"/>
+            <a:endParaRPr lang="en-US"/>
+          </a:p>
+        </p:txBody>
+      </p:sp>
       <p:grpSp>
         <p:nvGrpSpPr>
-          <p:cNvPr id="60" name="Group 59"/>
+          <p:cNvPr id="6" name="Group 5"/>
           <p:cNvGrpSpPr/>
           <p:nvPr/>
         </p:nvGrpSpPr>
         <p:grpSpPr>
           <a:xfrm>
-            <a:off x="0" y="20608742"/>
-            <a:ext cx="30267275" cy="11439628"/>
-            <a:chOff x="0" y="20608742"/>
-            <a:chExt cx="30412229" cy="11439628"/>
+            <a:off x="22524981" y="21905867"/>
+            <a:ext cx="7742294" cy="2819796"/>
+            <a:chOff x="22524981" y="21905867"/>
+            <a:chExt cx="7742294" cy="2819796"/>
           </a:xfrm>
         </p:grpSpPr>
-        <p:sp>
-          <p:nvSpPr>
-            <p:cNvPr id="75" name="Speech Bubble: Rectangle 74"/>
-            <p:cNvSpPr/>
-            <p:nvPr/>
-          </p:nvSpPr>
-          <p:spPr>
-            <a:xfrm rot="10800000">
-              <a:off x="0" y="20608742"/>
-              <a:ext cx="30407930" cy="11439628"/>
-            </a:xfrm>
-            <a:prstGeom prst="wedgeRectCallout">
-              <a:avLst>
-                <a:gd name="adj1" fmla="val -33287"/>
-                <a:gd name="adj2" fmla="val 69533"/>
-              </a:avLst>
-            </a:prstGeom>
-            <a:solidFill>
-              <a:srgbClr val="EEDD96">
-                <a:alpha val="75000"/>
-              </a:srgbClr>
-            </a:solidFill>
-            <a:ln>
-              <a:noFill/>
-            </a:ln>
-          </p:spPr>
-          <p:style>
-            <a:lnRef idx="2">
-              <a:schemeClr val="accent1">
-                <a:shade val="50000"/>
-              </a:schemeClr>
-            </a:lnRef>
-            <a:fillRef idx="1">
-              <a:schemeClr val="accent1"/>
-            </a:fillRef>
-            <a:effectRef idx="0">
-              <a:schemeClr val="accent1"/>
-            </a:effectRef>
-            <a:fontRef idx="minor">
-              <a:schemeClr val="lt1"/>
-            </a:fontRef>
-          </p:style>
-          <p:txBody>
-            <a:bodyPr rtlCol="0" anchor="ctr"/>
-            <a:lstStyle/>
-            <a:p>
-              <a:pPr algn="ctr"/>
-              <a:endParaRPr lang="en-US"/>
-            </a:p>
-          </p:txBody>
-        </p:sp>
         <p:sp>
           <p:nvSpPr>
             <p:cNvPr id="77" name="Arrow: Pentagon 76"/>
@@ -5331,8 +4664,8 @@
           </p:nvSpPr>
           <p:spPr>
             <a:xfrm rot="10800000">
-              <a:off x="22632856" y="21905867"/>
-              <a:ext cx="7779373" cy="2819796"/>
+              <a:off x="22524981" y="21905867"/>
+              <a:ext cx="7742294" cy="2819796"/>
             </a:xfrm>
             <a:prstGeom prst="homePlate">
               <a:avLst/>
@@ -5382,8 +4715,8 @@
           </p:nvSpPr>
           <p:spPr>
             <a:xfrm>
-              <a:off x="24560398" y="22500156"/>
-              <a:ext cx="5368302" cy="1631216"/>
+              <a:off x="24443336" y="22500155"/>
+              <a:ext cx="5342715" cy="1631217"/>
             </a:xfrm>
             <a:prstGeom prst="rect">
               <a:avLst/>
@@ -5421,10 +4754,10 @@
         </p:nvGrpSpPr>
         <p:grpSpPr>
           <a:xfrm>
-            <a:off x="-3" y="32865657"/>
-            <a:ext cx="30267278" cy="9928580"/>
-            <a:chOff x="-140658" y="32745983"/>
-            <a:chExt cx="30465706" cy="10253287"/>
+            <a:off x="-4" y="32642660"/>
+            <a:ext cx="30267279" cy="10151577"/>
+            <a:chOff x="-140659" y="32515693"/>
+            <a:chExt cx="30465707" cy="10483577"/>
           </a:xfrm>
         </p:grpSpPr>
         <p:sp>
@@ -5435,8 +4768,8 @@
           </p:nvSpPr>
           <p:spPr>
             <a:xfrm rot="10800000">
-              <a:off x="-140658" y="32745983"/>
-              <a:ext cx="30465705" cy="10253287"/>
+              <a:off x="-140659" y="32515693"/>
+              <a:ext cx="30465705" cy="10483577"/>
             </a:xfrm>
             <a:prstGeom prst="wedgeRectCallout">
               <a:avLst>
@@ -5581,54 +4914,188 @@
           </p:sp>
         </p:grpSp>
       </p:grpSp>
-      <p:sp>
-        <p:nvSpPr>
-          <p:cNvPr id="82" name="Oval 81"/>
-          <p:cNvSpPr/>
+      <p:grpSp>
+        <p:nvGrpSpPr>
+          <p:cNvPr id="11" name="Group 10"/>
+          <p:cNvGrpSpPr/>
           <p:nvPr/>
-        </p:nvSpPr>
-        <p:spPr>
+        </p:nvGrpSpPr>
+        <p:grpSpPr>
           <a:xfrm>
-            <a:off x="10921058" y="11254012"/>
-            <a:ext cx="8040015" cy="7429465"/>
+            <a:off x="10777675" y="10183183"/>
+            <a:ext cx="8040015" cy="9684758"/>
+            <a:chOff x="10921058" y="8998719"/>
+            <a:chExt cx="8040015" cy="9684758"/>
           </a:xfrm>
-          <a:prstGeom prst="ellipse">
-            <a:avLst/>
-          </a:prstGeom>
-          <a:solidFill>
-            <a:srgbClr val="CD6D6D">
-              <a:alpha val="13000"/>
-            </a:srgbClr>
-          </a:solidFill>
-          <a:ln>
-            <a:noFill/>
-          </a:ln>
-        </p:spPr>
-        <p:style>
-          <a:lnRef idx="2">
-            <a:schemeClr val="accent1">
-              <a:shade val="50000"/>
-            </a:schemeClr>
-          </a:lnRef>
-          <a:fillRef idx="1">
-            <a:schemeClr val="accent1"/>
-          </a:fillRef>
-          <a:effectRef idx="0">
-            <a:schemeClr val="accent1"/>
-          </a:effectRef>
-          <a:fontRef idx="minor">
-            <a:schemeClr val="lt1"/>
-          </a:fontRef>
-        </p:style>
-        <p:txBody>
-          <a:bodyPr rtlCol="0" anchor="ctr"/>
-          <a:lstStyle/>
-          <a:p>
-            <a:pPr algn="ctr"/>
-            <a:endParaRPr lang="en-US"/>
-          </a:p>
-        </p:txBody>
-      </p:sp>
+        </p:grpSpPr>
+        <p:grpSp>
+          <p:nvGrpSpPr>
+            <p:cNvPr id="29" name="Group 28"/>
+            <p:cNvGrpSpPr/>
+            <p:nvPr/>
+          </p:nvGrpSpPr>
+          <p:grpSpPr>
+            <a:xfrm>
+              <a:off x="11114259" y="8998719"/>
+              <a:ext cx="5944661" cy="8249571"/>
+              <a:chOff x="12160993" y="8496621"/>
+              <a:chExt cx="5944661" cy="8249571"/>
+            </a:xfrm>
+          </p:grpSpPr>
+          <p:sp>
+            <p:nvSpPr>
+              <p:cNvPr id="70" name="Shape 70"/>
+              <p:cNvSpPr/>
+              <p:nvPr/>
+            </p:nvSpPr>
+            <p:spPr>
+              <a:xfrm>
+                <a:off x="12160993" y="9778349"/>
+                <a:ext cx="5944661" cy="6967843"/>
+              </a:xfrm>
+              <a:prstGeom prst="flowChartMagneticDisk">
+                <a:avLst/>
+              </a:prstGeom>
+              <a:noFill/>
+              <a:ln w="38100" cap="flat" cmpd="sng">
+                <a:solidFill>
+                  <a:srgbClr val="000000"/>
+                </a:solidFill>
+                <a:prstDash val="solid"/>
+                <a:round/>
+                <a:headEnd type="none" w="med" len="med"/>
+                <a:tailEnd type="none" w="med" len="med"/>
+              </a:ln>
+            </p:spPr>
+            <p:txBody>
+              <a:bodyPr lIns="91425" tIns="91425" rIns="91425" bIns="91425" anchor="ctr" anchorCtr="0">
+                <a:noAutofit/>
+              </a:bodyPr>
+              <a:lstStyle/>
+              <a:p>
+                <a:pPr lvl="0">
+                  <a:spcBef>
+                    <a:spcPts val="0"/>
+                  </a:spcBef>
+                  <a:buNone/>
+                </a:pPr>
+                <a:endParaRPr/>
+              </a:p>
+            </p:txBody>
+          </p:sp>
+          <p:sp>
+            <p:nvSpPr>
+              <p:cNvPr id="25" name="TextBox 24"/>
+              <p:cNvSpPr txBox="1"/>
+              <p:nvPr/>
+            </p:nvSpPr>
+            <p:spPr>
+              <a:xfrm>
+                <a:off x="13225589" y="8496621"/>
+                <a:ext cx="3815468" cy="861774"/>
+              </a:xfrm>
+              <a:prstGeom prst="rect">
+                <a:avLst/>
+              </a:prstGeom>
+              <a:noFill/>
+            </p:spPr>
+            <p:txBody>
+              <a:bodyPr wrap="none" rtlCol="0">
+                <a:spAutoFit/>
+              </a:bodyPr>
+              <a:lstStyle/>
+              <a:p>
+                <a:r>
+                  <a:rPr lang="en-US" sz="5000" dirty="0">
+                    <a:latin typeface="Oxygen" panose="02000503000000000000" pitchFamily="2" charset="0"/>
+                  </a:rPr>
+                  <a:t>The Problem</a:t>
+                </a:r>
+              </a:p>
+            </p:txBody>
+          </p:sp>
+          <p:sp>
+            <p:nvSpPr>
+              <p:cNvPr id="28" name="TextBox 27"/>
+              <p:cNvSpPr txBox="1"/>
+              <p:nvPr/>
+            </p:nvSpPr>
+            <p:spPr>
+              <a:xfrm>
+                <a:off x="12547735" y="12805877"/>
+                <a:ext cx="5171176" cy="1938992"/>
+              </a:xfrm>
+              <a:prstGeom prst="rect">
+                <a:avLst/>
+              </a:prstGeom>
+              <a:noFill/>
+            </p:spPr>
+            <p:txBody>
+              <a:bodyPr wrap="square" rtlCol="0">
+                <a:spAutoFit/>
+              </a:bodyPr>
+              <a:lstStyle/>
+              <a:p>
+                <a:pPr algn="ctr"/>
+                <a:r>
+                  <a:rPr lang="en-US" sz="3000" dirty="0">
+                    <a:latin typeface="Oxygen" panose="02000503000000000000" pitchFamily="2" charset="0"/>
+                  </a:rPr>
+                  <a:t>Guarantees planned in software architecture design do not always carry through to implementations.</a:t>
+                </a:r>
+              </a:p>
+            </p:txBody>
+          </p:sp>
+        </p:grpSp>
+        <p:sp>
+          <p:nvSpPr>
+            <p:cNvPr id="82" name="Oval 81"/>
+            <p:cNvSpPr/>
+            <p:nvPr/>
+          </p:nvSpPr>
+          <p:spPr>
+            <a:xfrm>
+              <a:off x="10921058" y="11254012"/>
+              <a:ext cx="8040015" cy="7429465"/>
+            </a:xfrm>
+            <a:prstGeom prst="ellipse">
+              <a:avLst/>
+            </a:prstGeom>
+            <a:solidFill>
+              <a:srgbClr val="CD6D6D">
+                <a:alpha val="13000"/>
+              </a:srgbClr>
+            </a:solidFill>
+            <a:ln>
+              <a:noFill/>
+            </a:ln>
+          </p:spPr>
+          <p:style>
+            <a:lnRef idx="2">
+              <a:schemeClr val="accent1">
+                <a:shade val="50000"/>
+              </a:schemeClr>
+            </a:lnRef>
+            <a:fillRef idx="1">
+              <a:schemeClr val="accent1"/>
+            </a:fillRef>
+            <a:effectRef idx="0">
+              <a:schemeClr val="accent1"/>
+            </a:effectRef>
+            <a:fontRef idx="minor">
+              <a:schemeClr val="lt1"/>
+            </a:fontRef>
+          </p:style>
+          <p:txBody>
+            <a:bodyPr rtlCol="0" anchor="ctr"/>
+            <a:lstStyle/>
+            <a:p>
+              <a:pPr algn="ctr"/>
+              <a:endParaRPr lang="en-US"/>
+            </a:p>
+          </p:txBody>
+        </p:sp>
+      </p:grpSp>
       <p:grpSp>
         <p:nvGrpSpPr>
           <p:cNvPr id="66" name="Group 65"/>
@@ -5637,8 +5104,8 @@
         </p:nvGrpSpPr>
         <p:grpSpPr>
           <a:xfrm>
-            <a:off x="-1014796" y="3933422"/>
-            <a:ext cx="11358461" cy="1837824"/>
+            <a:off x="-995622" y="3885549"/>
+            <a:ext cx="11358461" cy="1624971"/>
             <a:chOff x="-1300062" y="3789473"/>
             <a:chExt cx="11358461" cy="1837824"/>
           </a:xfrm>
@@ -6064,6 +5531,1414 @@
             </a:p>
           </p:txBody>
         </p:sp>
+      </p:grpSp>
+      <p:sp>
+        <p:nvSpPr>
+          <p:cNvPr id="10" name="TextBox 9"/>
+          <p:cNvSpPr txBox="1"/>
+          <p:nvPr/>
+        </p:nvSpPr>
+        <p:spPr>
+          <a:xfrm>
+            <a:off x="659567" y="5951372"/>
+            <a:ext cx="12478917" cy="1938992"/>
+          </a:xfrm>
+          <a:prstGeom prst="rect">
+            <a:avLst/>
+          </a:prstGeom>
+          <a:noFill/>
+        </p:spPr>
+        <p:txBody>
+          <a:bodyPr wrap="square" rtlCol="0">
+            <a:spAutoFit/>
+          </a:bodyPr>
+          <a:lstStyle/>
+          <a:p>
+            <a:pPr algn="ctr"/>
+            <a:r>
+              <a:rPr lang="en-US" sz="4000" b="1" i="1" dirty="0">
+                <a:solidFill>
+                  <a:schemeClr val="tx2">
+                    <a:lumMod val="75000"/>
+                  </a:schemeClr>
+                </a:solidFill>
+                <a:latin typeface="Oxygen" panose="02000503000000000000" pitchFamily="2" charset="0"/>
+              </a:rPr>
+              <a:t>the “fundamental organization of a system embodied in its components, their relations to each other, and the environment”</a:t>
+            </a:r>
+            <a:endParaRPr lang="en-US" sz="4000" b="1" i="1" dirty="0">
+              <a:solidFill>
+                <a:schemeClr val="tx2">
+                  <a:lumMod val="75000"/>
+                </a:schemeClr>
+              </a:solidFill>
+              <a:latin typeface="Oxygen" panose="02000503000000000000" pitchFamily="2" charset="0"/>
+            </a:endParaRPr>
+          </a:p>
+        </p:txBody>
+      </p:sp>
+      <p:grpSp>
+        <p:nvGrpSpPr>
+          <p:cNvPr id="107" name="Group 106"/>
+          <p:cNvGrpSpPr/>
+          <p:nvPr/>
+        </p:nvGrpSpPr>
+        <p:grpSpPr>
+          <a:xfrm>
+            <a:off x="659567" y="8095201"/>
+            <a:ext cx="10194379" cy="11764289"/>
+            <a:chOff x="659567" y="8095201"/>
+            <a:chExt cx="10194379" cy="11764289"/>
+          </a:xfrm>
+        </p:grpSpPr>
+        <p:sp>
+          <p:nvSpPr>
+            <p:cNvPr id="26" name="TextBox 25"/>
+            <p:cNvSpPr txBox="1"/>
+            <p:nvPr/>
+          </p:nvSpPr>
+          <p:spPr>
+            <a:xfrm>
+              <a:off x="1335769" y="8095201"/>
+              <a:ext cx="7161800" cy="861774"/>
+            </a:xfrm>
+            <a:prstGeom prst="rect">
+              <a:avLst/>
+            </a:prstGeom>
+            <a:noFill/>
+          </p:spPr>
+          <p:txBody>
+            <a:bodyPr wrap="square" rtlCol="0">
+              <a:spAutoFit/>
+            </a:bodyPr>
+            <a:lstStyle/>
+            <a:p>
+              <a:r>
+                <a:rPr lang="en-US" b="1" dirty="0">
+                  <a:latin typeface="Oxygen" panose="02000503000000000000" pitchFamily="2" charset="0"/>
+                </a:rPr>
+                <a:t>	</a:t>
+              </a:r>
+              <a:r>
+                <a:rPr lang="en-US" sz="5000" b="1" dirty="0">
+                  <a:latin typeface="Oxygen" panose="02000503000000000000" pitchFamily="2" charset="0"/>
+                </a:rPr>
+                <a:t>Architecture Views</a:t>
+              </a:r>
+              <a:endParaRPr lang="en-US" b="1" dirty="0">
+                <a:latin typeface="Oxygen" panose="02000503000000000000" pitchFamily="2" charset="0"/>
+              </a:endParaRPr>
+            </a:p>
+          </p:txBody>
+        </p:sp>
+        <p:grpSp>
+          <p:nvGrpSpPr>
+            <p:cNvPr id="106" name="Group 105"/>
+            <p:cNvGrpSpPr/>
+            <p:nvPr/>
+          </p:nvGrpSpPr>
+          <p:grpSpPr>
+            <a:xfrm>
+              <a:off x="659567" y="8956974"/>
+              <a:ext cx="10194379" cy="10902516"/>
+              <a:chOff x="659567" y="8956974"/>
+              <a:chExt cx="10194379" cy="10902516"/>
+            </a:xfrm>
+          </p:grpSpPr>
+          <p:sp>
+            <p:nvSpPr>
+              <p:cNvPr id="27" name="Flowchart: Connector 26"/>
+              <p:cNvSpPr/>
+              <p:nvPr/>
+            </p:nvSpPr>
+            <p:spPr>
+              <a:xfrm>
+                <a:off x="6405315" y="10669812"/>
+                <a:ext cx="1420796" cy="1378404"/>
+              </a:xfrm>
+              <a:prstGeom prst="flowChartConnector">
+                <a:avLst/>
+              </a:prstGeom>
+              <a:solidFill>
+                <a:schemeClr val="tx2">
+                  <a:lumMod val="50000"/>
+                  <a:alpha val="65000"/>
+                </a:schemeClr>
+              </a:solidFill>
+              <a:ln>
+                <a:noFill/>
+              </a:ln>
+            </p:spPr>
+            <p:style>
+              <a:lnRef idx="2">
+                <a:schemeClr val="accent1">
+                  <a:shade val="50000"/>
+                </a:schemeClr>
+              </a:lnRef>
+              <a:fillRef idx="1">
+                <a:schemeClr val="accent1"/>
+              </a:fillRef>
+              <a:effectRef idx="0">
+                <a:schemeClr val="accent1"/>
+              </a:effectRef>
+              <a:fontRef idx="minor">
+                <a:schemeClr val="lt1"/>
+              </a:fontRef>
+            </p:style>
+            <p:txBody>
+              <a:bodyPr rtlCol="0" anchor="ctr"/>
+              <a:lstStyle/>
+              <a:p>
+                <a:pPr algn="ctr"/>
+                <a:r>
+                  <a:rPr lang="en-US" sz="3000" b="1" dirty="0">
+                    <a:latin typeface="Consolas" panose="020B0609020204030204" pitchFamily="49" charset="0"/>
+                  </a:rPr>
+                  <a:t>&lt;/&gt;</a:t>
+                </a:r>
+              </a:p>
+            </p:txBody>
+          </p:sp>
+          <p:grpSp>
+            <p:nvGrpSpPr>
+              <p:cNvPr id="67" name="Group 66"/>
+              <p:cNvGrpSpPr/>
+              <p:nvPr/>
+            </p:nvGrpSpPr>
+            <p:grpSpPr>
+              <a:xfrm>
+                <a:off x="6153077" y="14756900"/>
+                <a:ext cx="1675276" cy="1015267"/>
+                <a:chOff x="2183258" y="13151911"/>
+                <a:chExt cx="1066828" cy="730075"/>
+              </a:xfrm>
+            </p:grpSpPr>
+            <p:grpSp>
+              <p:nvGrpSpPr>
+                <p:cNvPr id="35" name="Group 34"/>
+                <p:cNvGrpSpPr/>
+                <p:nvPr/>
+              </p:nvGrpSpPr>
+              <p:grpSpPr>
+                <a:xfrm>
+                  <a:off x="2183258" y="13151911"/>
+                  <a:ext cx="1066828" cy="730075"/>
+                  <a:chOff x="2183258" y="13166093"/>
+                  <a:chExt cx="1066828" cy="730075"/>
+                </a:xfrm>
+              </p:grpSpPr>
+              <p:grpSp>
+                <p:nvGrpSpPr>
+                  <p:cNvPr id="32" name="Group 31"/>
+                  <p:cNvGrpSpPr/>
+                  <p:nvPr/>
+                </p:nvGrpSpPr>
+                <p:grpSpPr>
+                  <a:xfrm>
+                    <a:off x="2183258" y="13166093"/>
+                    <a:ext cx="1066828" cy="259425"/>
+                    <a:chOff x="2285038" y="13236251"/>
+                    <a:chExt cx="1658746" cy="269461"/>
+                  </a:xfrm>
+                </p:grpSpPr>
+                <p:sp>
+                  <p:nvSpPr>
+                    <p:cNvPr id="31" name="Rectangle 30"/>
+                    <p:cNvSpPr/>
+                    <p:nvPr/>
+                  </p:nvSpPr>
+                  <p:spPr>
+                    <a:xfrm>
+                      <a:off x="2285038" y="13236891"/>
+                      <a:ext cx="392960" cy="268821"/>
+                    </a:xfrm>
+                    <a:prstGeom prst="rect">
+                      <a:avLst/>
+                    </a:prstGeom>
+                    <a:solidFill>
+                      <a:schemeClr val="tx2">
+                        <a:lumMod val="50000"/>
+                        <a:alpha val="60000"/>
+                      </a:schemeClr>
+                    </a:solidFill>
+                    <a:ln>
+                      <a:solidFill>
+                        <a:schemeClr val="accent1">
+                          <a:shade val="50000"/>
+                        </a:schemeClr>
+                      </a:solidFill>
+                    </a:ln>
+                  </p:spPr>
+                  <p:style>
+                    <a:lnRef idx="2">
+                      <a:schemeClr val="accent1">
+                        <a:shade val="50000"/>
+                      </a:schemeClr>
+                    </a:lnRef>
+                    <a:fillRef idx="1">
+                      <a:schemeClr val="accent1"/>
+                    </a:fillRef>
+                    <a:effectRef idx="0">
+                      <a:schemeClr val="accent1"/>
+                    </a:effectRef>
+                    <a:fontRef idx="minor">
+                      <a:schemeClr val="lt1"/>
+                    </a:fontRef>
+                  </p:style>
+                  <p:txBody>
+                    <a:bodyPr rtlCol="0" anchor="ctr"/>
+                    <a:lstStyle/>
+                    <a:p>
+                      <a:pPr algn="ctr"/>
+                      <a:endParaRPr lang="en-US"/>
+                    </a:p>
+                  </p:txBody>
+                </p:sp>
+                <p:sp>
+                  <p:nvSpPr>
+                    <p:cNvPr id="71" name="Rectangle 70"/>
+                    <p:cNvSpPr/>
+                    <p:nvPr/>
+                  </p:nvSpPr>
+                  <p:spPr>
+                    <a:xfrm>
+                      <a:off x="2915579" y="13236251"/>
+                      <a:ext cx="392961" cy="269451"/>
+                    </a:xfrm>
+                    <a:prstGeom prst="rect">
+                      <a:avLst/>
+                    </a:prstGeom>
+                    <a:solidFill>
+                      <a:schemeClr val="tx2">
+                        <a:lumMod val="50000"/>
+                        <a:alpha val="60000"/>
+                      </a:schemeClr>
+                    </a:solidFill>
+                    <a:ln>
+                      <a:solidFill>
+                        <a:schemeClr val="accent1">
+                          <a:shade val="50000"/>
+                        </a:schemeClr>
+                      </a:solidFill>
+                    </a:ln>
+                  </p:spPr>
+                  <p:style>
+                    <a:lnRef idx="2">
+                      <a:schemeClr val="accent1">
+                        <a:shade val="50000"/>
+                      </a:schemeClr>
+                    </a:lnRef>
+                    <a:fillRef idx="1">
+                      <a:schemeClr val="accent1"/>
+                    </a:fillRef>
+                    <a:effectRef idx="0">
+                      <a:schemeClr val="accent1"/>
+                    </a:effectRef>
+                    <a:fontRef idx="minor">
+                      <a:schemeClr val="lt1"/>
+                    </a:fontRef>
+                  </p:style>
+                  <p:txBody>
+                    <a:bodyPr rtlCol="0" anchor="ctr"/>
+                    <a:lstStyle/>
+                    <a:p>
+                      <a:pPr algn="ctr"/>
+                      <a:endParaRPr lang="en-US"/>
+                    </a:p>
+                  </p:txBody>
+                </p:sp>
+                <p:sp>
+                  <p:nvSpPr>
+                    <p:cNvPr id="72" name="Rectangle 71"/>
+                    <p:cNvSpPr/>
+                    <p:nvPr/>
+                  </p:nvSpPr>
+                  <p:spPr>
+                    <a:xfrm>
+                      <a:off x="3550824" y="13236259"/>
+                      <a:ext cx="392960" cy="269452"/>
+                    </a:xfrm>
+                    <a:prstGeom prst="rect">
+                      <a:avLst/>
+                    </a:prstGeom>
+                    <a:solidFill>
+                      <a:schemeClr val="tx2">
+                        <a:lumMod val="50000"/>
+                        <a:alpha val="60000"/>
+                      </a:schemeClr>
+                    </a:solidFill>
+                    <a:ln>
+                      <a:solidFill>
+                        <a:schemeClr val="accent1">
+                          <a:shade val="50000"/>
+                        </a:schemeClr>
+                      </a:solidFill>
+                    </a:ln>
+                  </p:spPr>
+                  <p:style>
+                    <a:lnRef idx="2">
+                      <a:schemeClr val="accent1">
+                        <a:shade val="50000"/>
+                      </a:schemeClr>
+                    </a:lnRef>
+                    <a:fillRef idx="1">
+                      <a:schemeClr val="accent1"/>
+                    </a:fillRef>
+                    <a:effectRef idx="0">
+                      <a:schemeClr val="accent1"/>
+                    </a:effectRef>
+                    <a:fontRef idx="minor">
+                      <a:schemeClr val="lt1"/>
+                    </a:fontRef>
+                  </p:style>
+                  <p:txBody>
+                    <a:bodyPr rtlCol="0" anchor="ctr"/>
+                    <a:lstStyle/>
+                    <a:p>
+                      <a:pPr algn="ctr"/>
+                      <a:endParaRPr lang="en-US"/>
+                    </a:p>
+                  </p:txBody>
+                </p:sp>
+              </p:grpSp>
+              <p:sp>
+                <p:nvSpPr>
+                  <p:cNvPr id="34" name="Flowchart: Magnetic Disk 33"/>
+                  <p:cNvSpPr/>
+                  <p:nvPr/>
+                </p:nvSpPr>
+                <p:spPr>
+                  <a:xfrm>
+                    <a:off x="2528005" y="13654978"/>
+                    <a:ext cx="374310" cy="241190"/>
+                  </a:xfrm>
+                  <a:prstGeom prst="flowChartMagneticDisk">
+                    <a:avLst/>
+                  </a:prstGeom>
+                  <a:solidFill>
+                    <a:schemeClr val="accent1">
+                      <a:alpha val="52000"/>
+                    </a:schemeClr>
+                  </a:solidFill>
+                  <a:ln>
+                    <a:solidFill>
+                      <a:schemeClr val="accent1">
+                        <a:shade val="50000"/>
+                      </a:schemeClr>
+                    </a:solidFill>
+                  </a:ln>
+                </p:spPr>
+                <p:style>
+                  <a:lnRef idx="2">
+                    <a:schemeClr val="accent1">
+                      <a:shade val="50000"/>
+                    </a:schemeClr>
+                  </a:lnRef>
+                  <a:fillRef idx="1">
+                    <a:schemeClr val="accent1"/>
+                  </a:fillRef>
+                  <a:effectRef idx="0">
+                    <a:schemeClr val="accent1"/>
+                  </a:effectRef>
+                  <a:fontRef idx="minor">
+                    <a:schemeClr val="lt1"/>
+                  </a:fontRef>
+                </p:style>
+                <p:txBody>
+                  <a:bodyPr rtlCol="0" anchor="ctr"/>
+                  <a:lstStyle/>
+                  <a:p>
+                    <a:pPr algn="ctr"/>
+                    <a:endParaRPr lang="en-US"/>
+                  </a:p>
+                </p:txBody>
+              </p:sp>
+            </p:grpSp>
+            <p:cxnSp>
+              <p:nvCxnSpPr>
+                <p:cNvPr id="37" name="Straight Arrow Connector 36"/>
+                <p:cNvCxnSpPr/>
+                <p:nvPr/>
+              </p:nvCxnSpPr>
+              <p:spPr>
+                <a:xfrm flipH="1">
+                  <a:off x="2715060" y="13411325"/>
+                  <a:ext cx="101" cy="208981"/>
+                </a:xfrm>
+                <a:prstGeom prst="straightConnector1">
+                  <a:avLst/>
+                </a:prstGeom>
+                <a:ln>
+                  <a:tailEnd type="arrow" w="med" len="sm"/>
+                </a:ln>
+              </p:spPr>
+              <p:style>
+                <a:lnRef idx="1">
+                  <a:schemeClr val="accent1"/>
+                </a:lnRef>
+                <a:fillRef idx="0">
+                  <a:schemeClr val="accent1"/>
+                </a:fillRef>
+                <a:effectRef idx="0">
+                  <a:schemeClr val="accent1"/>
+                </a:effectRef>
+                <a:fontRef idx="minor">
+                  <a:schemeClr val="tx1"/>
+                </a:fontRef>
+              </p:style>
+            </p:cxnSp>
+            <p:cxnSp>
+              <p:nvCxnSpPr>
+                <p:cNvPr id="47" name="Straight Arrow Connector 46"/>
+                <p:cNvCxnSpPr/>
+                <p:nvPr/>
+              </p:nvCxnSpPr>
+              <p:spPr>
+                <a:xfrm flipH="1">
+                  <a:off x="2914170" y="13411333"/>
+                  <a:ext cx="209550" cy="208975"/>
+                </a:xfrm>
+                <a:prstGeom prst="straightConnector1">
+                  <a:avLst/>
+                </a:prstGeom>
+                <a:ln>
+                  <a:tailEnd type="arrow"/>
+                </a:ln>
+              </p:spPr>
+              <p:style>
+                <a:lnRef idx="1">
+                  <a:schemeClr val="accent1"/>
+                </a:lnRef>
+                <a:fillRef idx="0">
+                  <a:schemeClr val="accent1"/>
+                </a:fillRef>
+                <a:effectRef idx="0">
+                  <a:schemeClr val="accent1"/>
+                </a:effectRef>
+                <a:fontRef idx="minor">
+                  <a:schemeClr val="tx1"/>
+                </a:fontRef>
+              </p:style>
+            </p:cxnSp>
+            <p:cxnSp>
+              <p:nvCxnSpPr>
+                <p:cNvPr id="59" name="Straight Arrow Connector 58"/>
+                <p:cNvCxnSpPr/>
+                <p:nvPr/>
+              </p:nvCxnSpPr>
+              <p:spPr>
+                <a:xfrm>
+                  <a:off x="2309625" y="13411333"/>
+                  <a:ext cx="218380" cy="208975"/>
+                </a:xfrm>
+                <a:prstGeom prst="straightConnector1">
+                  <a:avLst/>
+                </a:prstGeom>
+                <a:ln>
+                  <a:tailEnd type="arrow"/>
+                </a:ln>
+              </p:spPr>
+              <p:style>
+                <a:lnRef idx="1">
+                  <a:schemeClr val="accent1"/>
+                </a:lnRef>
+                <a:fillRef idx="0">
+                  <a:schemeClr val="accent1"/>
+                </a:fillRef>
+                <a:effectRef idx="0">
+                  <a:schemeClr val="accent1"/>
+                </a:effectRef>
+                <a:fontRef idx="minor">
+                  <a:schemeClr val="tx1"/>
+                </a:fontRef>
+              </p:style>
+            </p:cxnSp>
+          </p:grpSp>
+          <p:pic>
+            <p:nvPicPr>
+              <p:cNvPr id="100" name="Picture 99"/>
+              <p:cNvPicPr>
+                <a:picLocks noChangeAspect="1"/>
+              </p:cNvPicPr>
+              <p:nvPr/>
+            </p:nvPicPr>
+            <p:blipFill>
+              <a:blip r:embed="rId3"/>
+              <a:stretch>
+                <a:fillRect/>
+              </a:stretch>
+            </p:blipFill>
+            <p:spPr>
+              <a:xfrm>
+                <a:off x="6416523" y="18510663"/>
+                <a:ext cx="1348827" cy="1348827"/>
+              </a:xfrm>
+              <a:prstGeom prst="rect">
+                <a:avLst/>
+              </a:prstGeom>
+            </p:spPr>
+          </p:pic>
+          <p:grpSp>
+            <p:nvGrpSpPr>
+              <p:cNvPr id="105" name="Group 104"/>
+              <p:cNvGrpSpPr/>
+              <p:nvPr/>
+            </p:nvGrpSpPr>
+            <p:grpSpPr>
+              <a:xfrm>
+                <a:off x="659567" y="8956974"/>
+                <a:ext cx="10194379" cy="10881629"/>
+                <a:chOff x="659567" y="8956974"/>
+                <a:chExt cx="10194379" cy="10881629"/>
+              </a:xfrm>
+            </p:grpSpPr>
+            <p:grpSp>
+              <p:nvGrpSpPr>
+                <p:cNvPr id="41" name="Group 40"/>
+                <p:cNvGrpSpPr/>
+                <p:nvPr/>
+              </p:nvGrpSpPr>
+              <p:grpSpPr>
+                <a:xfrm>
+                  <a:off x="659567" y="8956974"/>
+                  <a:ext cx="10194379" cy="10881629"/>
+                  <a:chOff x="1577981" y="5906435"/>
+                  <a:chExt cx="9011111" cy="13240385"/>
+                </a:xfrm>
+              </p:grpSpPr>
+              <p:grpSp>
+                <p:nvGrpSpPr>
+                  <p:cNvPr id="24" name="Group 23"/>
+                  <p:cNvGrpSpPr/>
+                  <p:nvPr/>
+                </p:nvGrpSpPr>
+                <p:grpSpPr>
+                  <a:xfrm>
+                    <a:off x="1577981" y="5906435"/>
+                    <a:ext cx="7763946" cy="13240385"/>
+                    <a:chOff x="1467478" y="5729527"/>
+                    <a:chExt cx="7763946" cy="13240385"/>
+                  </a:xfrm>
+                </p:grpSpPr>
+                <p:grpSp>
+                  <p:nvGrpSpPr>
+                    <p:cNvPr id="23" name="Group 22"/>
+                    <p:cNvGrpSpPr/>
+                    <p:nvPr/>
+                  </p:nvGrpSpPr>
+                  <p:grpSpPr>
+                    <a:xfrm>
+                      <a:off x="1467478" y="5729527"/>
+                      <a:ext cx="7763946" cy="13240383"/>
+                      <a:chOff x="1467478" y="5729527"/>
+                      <a:chExt cx="7763946" cy="13240383"/>
+                    </a:xfrm>
+                  </p:grpSpPr>
+                  <p:grpSp>
+                    <p:nvGrpSpPr>
+                      <p:cNvPr id="18" name="Group 17"/>
+                      <p:cNvGrpSpPr/>
+                      <p:nvPr/>
+                    </p:nvGrpSpPr>
+                    <p:grpSpPr>
+                      <a:xfrm>
+                        <a:off x="2538536" y="5959861"/>
+                        <a:ext cx="6692888" cy="13010049"/>
+                        <a:chOff x="3325408" y="5804822"/>
+                        <a:chExt cx="6692888" cy="13010049"/>
+                      </a:xfrm>
+                    </p:grpSpPr>
+                    <p:grpSp>
+                      <p:nvGrpSpPr>
+                        <p:cNvPr id="17" name="Group 16"/>
+                        <p:cNvGrpSpPr/>
+                        <p:nvPr/>
+                      </p:nvGrpSpPr>
+                      <p:grpSpPr>
+                        <a:xfrm>
+                          <a:off x="3325408" y="5804822"/>
+                          <a:ext cx="6692888" cy="13010049"/>
+                          <a:chOff x="3325408" y="5804822"/>
+                          <a:chExt cx="6692888" cy="13010049"/>
+                        </a:xfrm>
+                      </p:grpSpPr>
+                      <p:grpSp>
+                        <p:nvGrpSpPr>
+                          <p:cNvPr id="5" name="Group 4"/>
+                          <p:cNvGrpSpPr/>
+                          <p:nvPr/>
+                        </p:nvGrpSpPr>
+                        <p:grpSpPr>
+                          <a:xfrm>
+                            <a:off x="3325408" y="5804822"/>
+                            <a:ext cx="5383840" cy="13010049"/>
+                            <a:chOff x="3325408" y="5804822"/>
+                            <a:chExt cx="5383840" cy="13010049"/>
+                          </a:xfrm>
+                        </p:grpSpPr>
+                        <p:sp>
+                          <p:nvSpPr>
+                            <p:cNvPr id="2" name="Rectangle 1"/>
+                            <p:cNvSpPr/>
+                            <p:nvPr/>
+                          </p:nvSpPr>
+                          <p:spPr>
+                            <a:xfrm>
+                              <a:off x="3325409" y="5804822"/>
+                              <a:ext cx="5383839" cy="3639460"/>
+                            </a:xfrm>
+                            <a:prstGeom prst="rect">
+                              <a:avLst/>
+                            </a:prstGeom>
+                            <a:noFill/>
+                            <a:ln cmpd="sng">
+                              <a:solidFill>
+                                <a:schemeClr val="tx2">
+                                  <a:lumMod val="50000"/>
+                                </a:schemeClr>
+                              </a:solidFill>
+                              <a:prstDash val="solid"/>
+                              <a:round/>
+                            </a:ln>
+                          </p:spPr>
+                          <p:style>
+                            <a:lnRef idx="2">
+                              <a:schemeClr val="accent1">
+                                <a:shade val="50000"/>
+                              </a:schemeClr>
+                            </a:lnRef>
+                            <a:fillRef idx="1">
+                              <a:schemeClr val="accent1"/>
+                            </a:fillRef>
+                            <a:effectRef idx="0">
+                              <a:schemeClr val="accent1"/>
+                            </a:effectRef>
+                            <a:fontRef idx="minor">
+                              <a:schemeClr val="lt1"/>
+                            </a:fontRef>
+                          </p:style>
+                          <p:txBody>
+                            <a:bodyPr rtlCol="0" anchor="ctr"/>
+                            <a:lstStyle/>
+                            <a:p>
+                              <a:pPr algn="ctr"/>
+                              <a:endParaRPr lang="en-US" sz="3000" dirty="0">
+                                <a:solidFill>
+                                  <a:schemeClr val="tx2">
+                                    <a:lumMod val="50000"/>
+                                  </a:schemeClr>
+                                </a:solidFill>
+                                <a:latin typeface="Oxygen" panose="02000503000000000000" pitchFamily="2" charset="0"/>
+                              </a:endParaRPr>
+                            </a:p>
+                          </p:txBody>
+                        </p:sp>
+                        <p:sp>
+                          <p:nvSpPr>
+                            <p:cNvPr id="12" name="Rectangle 11"/>
+                            <p:cNvSpPr/>
+                            <p:nvPr/>
+                          </p:nvSpPr>
+                          <p:spPr>
+                            <a:xfrm>
+                              <a:off x="3325408" y="10443536"/>
+                              <a:ext cx="5383839" cy="3639460"/>
+                            </a:xfrm>
+                            <a:prstGeom prst="rect">
+                              <a:avLst/>
+                            </a:prstGeom>
+                            <a:noFill/>
+                            <a:ln cmpd="sng">
+                              <a:solidFill>
+                                <a:schemeClr val="tx2">
+                                  <a:lumMod val="50000"/>
+                                </a:schemeClr>
+                              </a:solidFill>
+                              <a:prstDash val="solid"/>
+                              <a:round/>
+                            </a:ln>
+                          </p:spPr>
+                          <p:style>
+                            <a:lnRef idx="2">
+                              <a:schemeClr val="accent1">
+                                <a:shade val="50000"/>
+                              </a:schemeClr>
+                            </a:lnRef>
+                            <a:fillRef idx="1">
+                              <a:schemeClr val="accent1"/>
+                            </a:fillRef>
+                            <a:effectRef idx="0">
+                              <a:schemeClr val="accent1"/>
+                            </a:effectRef>
+                            <a:fontRef idx="minor">
+                              <a:schemeClr val="lt1"/>
+                            </a:fontRef>
+                          </p:style>
+                          <p:txBody>
+                            <a:bodyPr rtlCol="0" anchor="ctr"/>
+                            <a:lstStyle/>
+                            <a:p>
+                              <a:pPr algn="ctr"/>
+                              <a:endParaRPr lang="en-US"/>
+                            </a:p>
+                          </p:txBody>
+                        </p:sp>
+                        <p:sp>
+                          <p:nvSpPr>
+                            <p:cNvPr id="13" name="Rectangle 12"/>
+                            <p:cNvSpPr/>
+                            <p:nvPr/>
+                          </p:nvSpPr>
+                          <p:spPr>
+                            <a:xfrm>
+                              <a:off x="3325408" y="15175411"/>
+                              <a:ext cx="5383839" cy="3639460"/>
+                            </a:xfrm>
+                            <a:prstGeom prst="rect">
+                              <a:avLst/>
+                            </a:prstGeom>
+                            <a:noFill/>
+                            <a:ln cmpd="sng">
+                              <a:solidFill>
+                                <a:schemeClr val="tx2">
+                                  <a:lumMod val="50000"/>
+                                </a:schemeClr>
+                              </a:solidFill>
+                              <a:prstDash val="solid"/>
+                              <a:round/>
+                            </a:ln>
+                          </p:spPr>
+                          <p:style>
+                            <a:lnRef idx="2">
+                              <a:schemeClr val="accent1">
+                                <a:shade val="50000"/>
+                              </a:schemeClr>
+                            </a:lnRef>
+                            <a:fillRef idx="1">
+                              <a:schemeClr val="accent1"/>
+                            </a:fillRef>
+                            <a:effectRef idx="0">
+                              <a:schemeClr val="accent1"/>
+                            </a:effectRef>
+                            <a:fontRef idx="minor">
+                              <a:schemeClr val="lt1"/>
+                            </a:fontRef>
+                          </p:style>
+                          <p:txBody>
+                            <a:bodyPr rtlCol="0" anchor="ctr"/>
+                            <a:lstStyle/>
+                            <a:p>
+                              <a:pPr algn="ctr"/>
+                              <a:endParaRPr lang="en-US"/>
+                            </a:p>
+                          </p:txBody>
+                        </p:sp>
+                      </p:grpSp>
+                      <p:grpSp>
+                        <p:nvGrpSpPr>
+                          <p:cNvPr id="16" name="Group 15"/>
+                          <p:cNvGrpSpPr/>
+                          <p:nvPr/>
+                        </p:nvGrpSpPr>
+                        <p:grpSpPr>
+                          <a:xfrm>
+                            <a:off x="8709248" y="7624552"/>
+                            <a:ext cx="1309048" cy="9344526"/>
+                            <a:chOff x="8709248" y="7624552"/>
+                            <a:chExt cx="1309048" cy="9344526"/>
+                          </a:xfrm>
+                        </p:grpSpPr>
+                        <p:cxnSp>
+                          <p:nvCxnSpPr>
+                            <p:cNvPr id="9" name="Straight Connector 8"/>
+                            <p:cNvCxnSpPr>
+                              <a:stCxn id="2" idx="3"/>
+                            </p:cNvCxnSpPr>
+                            <p:nvPr/>
+                          </p:nvCxnSpPr>
+                          <p:spPr>
+                            <a:xfrm>
+                              <a:off x="8709248" y="7624552"/>
+                              <a:ext cx="1301026" cy="0"/>
+                            </a:xfrm>
+                            <a:prstGeom prst="line">
+                              <a:avLst/>
+                            </a:prstGeom>
+                            <a:ln w="63500" cmpd="sng">
+                              <a:solidFill>
+                                <a:schemeClr val="tx2">
+                                  <a:lumMod val="50000"/>
+                                </a:schemeClr>
+                              </a:solidFill>
+                              <a:prstDash val="solid"/>
+                              <a:round/>
+                            </a:ln>
+                          </p:spPr>
+                          <p:style>
+                            <a:lnRef idx="3">
+                              <a:schemeClr val="accent1"/>
+                            </a:lnRef>
+                            <a:fillRef idx="0">
+                              <a:schemeClr val="accent1"/>
+                            </a:fillRef>
+                            <a:effectRef idx="2">
+                              <a:schemeClr val="accent1"/>
+                            </a:effectRef>
+                            <a:fontRef idx="minor">
+                              <a:schemeClr val="tx1"/>
+                            </a:fontRef>
+                          </p:style>
+                        </p:cxnSp>
+                        <p:cxnSp>
+                          <p:nvCxnSpPr>
+                            <p:cNvPr id="21" name="Straight Connector 20"/>
+                            <p:cNvCxnSpPr/>
+                            <p:nvPr/>
+                          </p:nvCxnSpPr>
+                          <p:spPr>
+                            <a:xfrm>
+                              <a:off x="8716462" y="12272382"/>
+                              <a:ext cx="1301026" cy="0"/>
+                            </a:xfrm>
+                            <a:prstGeom prst="line">
+                              <a:avLst/>
+                            </a:prstGeom>
+                            <a:ln w="63500" cmpd="sng">
+                              <a:solidFill>
+                                <a:schemeClr val="tx2">
+                                  <a:lumMod val="50000"/>
+                                </a:schemeClr>
+                              </a:solidFill>
+                              <a:prstDash val="solid"/>
+                              <a:round/>
+                            </a:ln>
+                          </p:spPr>
+                          <p:style>
+                            <a:lnRef idx="3">
+                              <a:schemeClr val="accent1"/>
+                            </a:lnRef>
+                            <a:fillRef idx="0">
+                              <a:schemeClr val="accent1"/>
+                            </a:fillRef>
+                            <a:effectRef idx="2">
+                              <a:schemeClr val="accent1"/>
+                            </a:effectRef>
+                            <a:fontRef idx="minor">
+                              <a:schemeClr val="tx1"/>
+                            </a:fontRef>
+                          </p:style>
+                        </p:cxnSp>
+                        <p:cxnSp>
+                          <p:nvCxnSpPr>
+                            <p:cNvPr id="22" name="Straight Connector 21"/>
+                            <p:cNvCxnSpPr/>
+                            <p:nvPr/>
+                          </p:nvCxnSpPr>
+                          <p:spPr>
+                            <a:xfrm>
+                              <a:off x="8717270" y="16969078"/>
+                              <a:ext cx="1301026" cy="0"/>
+                            </a:xfrm>
+                            <a:prstGeom prst="line">
+                              <a:avLst/>
+                            </a:prstGeom>
+                            <a:ln w="63500" cmpd="sng">
+                              <a:solidFill>
+                                <a:schemeClr val="tx2">
+                                  <a:lumMod val="50000"/>
+                                </a:schemeClr>
+                              </a:solidFill>
+                              <a:prstDash val="solid"/>
+                              <a:round/>
+                            </a:ln>
+                          </p:spPr>
+                          <p:style>
+                            <a:lnRef idx="3">
+                              <a:schemeClr val="accent1"/>
+                            </a:lnRef>
+                            <a:fillRef idx="0">
+                              <a:schemeClr val="accent1"/>
+                            </a:fillRef>
+                            <a:effectRef idx="2">
+                              <a:schemeClr val="accent1"/>
+                            </a:effectRef>
+                            <a:fontRef idx="minor">
+                              <a:schemeClr val="tx1"/>
+                            </a:fontRef>
+                          </p:style>
+                        </p:cxnSp>
+                      </p:grpSp>
+                    </p:grpSp>
+                    <p:cxnSp>
+                      <p:nvCxnSpPr>
+                        <p:cNvPr id="15" name="Straight Connector 14"/>
+                        <p:cNvCxnSpPr/>
+                        <p:nvPr/>
+                      </p:nvCxnSpPr>
+                      <p:spPr>
+                        <a:xfrm flipH="1">
+                          <a:off x="10010274" y="7624552"/>
+                          <a:ext cx="8022" cy="9370589"/>
+                        </a:xfrm>
+                        <a:prstGeom prst="line">
+                          <a:avLst/>
+                        </a:prstGeom>
+                        <a:ln w="63500" cmpd="sng">
+                          <a:solidFill>
+                            <a:schemeClr val="tx2">
+                              <a:lumMod val="50000"/>
+                            </a:schemeClr>
+                          </a:solidFill>
+                          <a:prstDash val="solid"/>
+                          <a:round/>
+                        </a:ln>
+                      </p:spPr>
+                      <p:style>
+                        <a:lnRef idx="1">
+                          <a:schemeClr val="accent1"/>
+                        </a:lnRef>
+                        <a:fillRef idx="0">
+                          <a:schemeClr val="accent1"/>
+                        </a:fillRef>
+                        <a:effectRef idx="0">
+                          <a:schemeClr val="accent1"/>
+                        </a:effectRef>
+                        <a:fontRef idx="minor">
+                          <a:schemeClr val="tx1"/>
+                        </a:fontRef>
+                      </p:style>
+                    </p:cxnSp>
+                  </p:grpSp>
+                  <p:sp>
+                    <p:nvSpPr>
+                      <p:cNvPr id="20" name="TextBox 19"/>
+                      <p:cNvSpPr txBox="1"/>
+                      <p:nvPr/>
+                    </p:nvSpPr>
+                    <p:spPr>
+                      <a:xfrm rot="16200000">
+                        <a:off x="65717" y="7184617"/>
+                        <a:ext cx="3971185" cy="1061006"/>
+                      </a:xfrm>
+                      <a:prstGeom prst="rect">
+                        <a:avLst/>
+                      </a:prstGeom>
+                      <a:noFill/>
+                    </p:spPr>
+                    <p:txBody>
+                      <a:bodyPr wrap="square" rtlCol="0">
+                        <a:spAutoFit/>
+                      </a:bodyPr>
+                      <a:lstStyle/>
+                      <a:p>
+                        <a:pPr algn="ctr"/>
+                        <a:r>
+                          <a:rPr lang="en-US" sz="3600" dirty="0">
+                            <a:latin typeface="Oxygen" panose="02000503000000000000" pitchFamily="2" charset="0"/>
+                          </a:rPr>
+                          <a:t>Module or Code</a:t>
+                        </a:r>
+                      </a:p>
+                    </p:txBody>
+                  </p:sp>
+                  <p:sp>
+                    <p:nvSpPr>
+                      <p:cNvPr id="30" name="TextBox 29"/>
+                      <p:cNvSpPr txBox="1"/>
+                      <p:nvPr/>
+                    </p:nvSpPr>
+                    <p:spPr>
+                      <a:xfrm rot="16200000">
+                        <a:off x="123841" y="11942212"/>
+                        <a:ext cx="3639460" cy="952185"/>
+                      </a:xfrm>
+                      <a:prstGeom prst="rect">
+                        <a:avLst/>
+                      </a:prstGeom>
+                      <a:noFill/>
+                    </p:spPr>
+                    <p:txBody>
+                      <a:bodyPr wrap="square" rtlCol="0">
+                        <a:spAutoFit/>
+                      </a:bodyPr>
+                      <a:lstStyle/>
+                      <a:p>
+                        <a:r>
+                          <a:rPr lang="en-US" sz="3200" dirty="0">
+                            <a:latin typeface="Oxygen" panose="02000503000000000000" pitchFamily="2" charset="0"/>
+                          </a:rPr>
+                          <a:t>Component </a:t>
+                        </a:r>
+                      </a:p>
+                      <a:p>
+                        <a:pPr algn="ctr"/>
+                        <a:r>
+                          <a:rPr lang="en-US" sz="3200" dirty="0">
+                            <a:latin typeface="Oxygen" panose="02000503000000000000" pitchFamily="2" charset="0"/>
+                          </a:rPr>
+                          <a:t>and Connector</a:t>
+                        </a:r>
+                      </a:p>
+                    </p:txBody>
+                  </p:sp>
+                </p:grpSp>
+                <p:sp>
+                  <p:nvSpPr>
+                    <p:cNvPr id="33" name="TextBox 32"/>
+                    <p:cNvSpPr txBox="1"/>
+                    <p:nvPr/>
+                  </p:nvSpPr>
+                  <p:spPr>
+                    <a:xfrm rot="16200000">
+                      <a:off x="306512" y="16878128"/>
+                      <a:ext cx="3639462" cy="544105"/>
+                    </a:xfrm>
+                    <a:prstGeom prst="rect">
+                      <a:avLst/>
+                    </a:prstGeom>
+                    <a:noFill/>
+                  </p:spPr>
+                  <p:txBody>
+                    <a:bodyPr wrap="square" rtlCol="0">
+                      <a:spAutoFit/>
+                    </a:bodyPr>
+                    <a:lstStyle/>
+                    <a:p>
+                      <a:pPr algn="ctr"/>
+                      <a:r>
+                        <a:rPr lang="en-US" sz="3400" dirty="0">
+                          <a:latin typeface="Oxygen" panose="02000503000000000000" pitchFamily="2" charset="0"/>
+                        </a:rPr>
+                        <a:t>Deployment</a:t>
+                      </a:r>
+                    </a:p>
+                  </p:txBody>
+                </p:sp>
+              </p:grpSp>
+              <p:cxnSp>
+                <p:nvCxnSpPr>
+                  <p:cNvPr id="38" name="Straight Arrow Connector 37"/>
+                  <p:cNvCxnSpPr/>
+                  <p:nvPr/>
+                </p:nvCxnSpPr>
+                <p:spPr>
+                  <a:xfrm>
+                    <a:off x="9348334" y="12604328"/>
+                    <a:ext cx="1240758" cy="1"/>
+                  </a:xfrm>
+                  <a:prstGeom prst="straightConnector1">
+                    <a:avLst/>
+                  </a:prstGeom>
+                  <a:ln w="63500" cmpd="sng">
+                    <a:solidFill>
+                      <a:schemeClr val="tx2">
+                        <a:lumMod val="50000"/>
+                      </a:schemeClr>
+                    </a:solidFill>
+                    <a:prstDash val="solid"/>
+                    <a:round/>
+                    <a:headEnd type="none"/>
+                    <a:tailEnd type="stealth" w="lg" len="lg"/>
+                  </a:ln>
+                </p:spPr>
+                <p:style>
+                  <a:lnRef idx="1">
+                    <a:schemeClr val="accent1"/>
+                  </a:lnRef>
+                  <a:fillRef idx="0">
+                    <a:schemeClr val="accent1"/>
+                  </a:fillRef>
+                  <a:effectRef idx="0">
+                    <a:schemeClr val="accent1"/>
+                  </a:effectRef>
+                  <a:fontRef idx="minor">
+                    <a:schemeClr val="tx1"/>
+                  </a:fontRef>
+                </p:style>
+              </p:cxnSp>
+            </p:grpSp>
+            <p:sp>
+              <p:nvSpPr>
+                <p:cNvPr id="101" name="TextBox 100"/>
+                <p:cNvSpPr txBox="1"/>
+                <p:nvPr/>
+              </p:nvSpPr>
+              <p:spPr>
+                <a:xfrm>
+                  <a:off x="1908442" y="9241361"/>
+                  <a:ext cx="6016454" cy="2339102"/>
+                </a:xfrm>
+                <a:prstGeom prst="rect">
+                  <a:avLst/>
+                </a:prstGeom>
+                <a:noFill/>
+              </p:spPr>
+              <p:txBody>
+                <a:bodyPr wrap="square" rtlCol="0">
+                  <a:spAutoFit/>
+                </a:bodyPr>
+                <a:lstStyle/>
+                <a:p>
+                  <a:r>
+                    <a:rPr lang="en-US" sz="2300" b="1" dirty="0">
+                      <a:solidFill>
+                        <a:schemeClr val="tx2">
+                          <a:lumMod val="50000"/>
+                        </a:schemeClr>
+                      </a:solidFill>
+                      <a:latin typeface="Oxygen" panose="02000503000000000000" pitchFamily="2" charset="0"/>
+                    </a:rPr>
+                    <a:t>Modules: </a:t>
+                  </a:r>
+                  <a:r>
+                    <a:rPr lang="en-US" sz="2300" dirty="0">
+                      <a:solidFill>
+                        <a:schemeClr val="tx2">
+                          <a:lumMod val="50000"/>
+                        </a:schemeClr>
+                      </a:solidFill>
+                      <a:latin typeface="Oxygen" panose="02000503000000000000" pitchFamily="2" charset="0"/>
+                    </a:rPr>
+                    <a:t>principal units of implementation</a:t>
+                  </a:r>
+                </a:p>
+                <a:p>
+                  <a:endParaRPr lang="en-US" sz="2300" dirty="0">
+                    <a:solidFill>
+                      <a:schemeClr val="tx2">
+                        <a:lumMod val="50000"/>
+                      </a:schemeClr>
+                    </a:solidFill>
+                    <a:latin typeface="Oxygen" panose="02000503000000000000" pitchFamily="2" charset="0"/>
+                  </a:endParaRPr>
+                </a:p>
+                <a:p>
+                  <a:pPr marL="457200" indent="-457200">
+                    <a:buFont typeface="Arial" panose="020B0604020202020204" pitchFamily="34" charset="0"/>
+                    <a:buChar char="•"/>
+                  </a:pPr>
+                  <a:r>
+                    <a:rPr lang="en-US" sz="2400" dirty="0">
+                      <a:solidFill>
+                        <a:schemeClr val="tx2">
+                          <a:lumMod val="50000"/>
+                        </a:schemeClr>
+                      </a:solidFill>
+                      <a:latin typeface="Oxygen" panose="02000503000000000000" pitchFamily="2" charset="0"/>
+                    </a:rPr>
+                    <a:t>Used to explain system functionality + structure of code base</a:t>
+                  </a:r>
+                </a:p>
+                <a:p>
+                  <a:pPr marL="457200" indent="-457200">
+                    <a:buFont typeface="Arial" panose="020B0604020202020204" pitchFamily="34" charset="0"/>
+                    <a:buChar char="•"/>
+                  </a:pPr>
+                  <a:r>
+                    <a:rPr lang="en-US" sz="2400" dirty="0">
+                      <a:solidFill>
+                        <a:schemeClr val="tx2">
+                          <a:lumMod val="50000"/>
+                        </a:schemeClr>
+                      </a:solidFill>
+                      <a:latin typeface="Oxygen" panose="02000503000000000000" pitchFamily="2" charset="0"/>
+                    </a:rPr>
+                    <a:t>Analysis</a:t>
+                  </a:r>
+                  <a:endParaRPr lang="en-US" sz="2400" dirty="0">
+                    <a:solidFill>
+                      <a:schemeClr val="tx2">
+                        <a:lumMod val="50000"/>
+                      </a:schemeClr>
+                    </a:solidFill>
+                    <a:latin typeface="Oxygen" panose="02000503000000000000" pitchFamily="2" charset="0"/>
+                  </a:endParaRPr>
+                </a:p>
+                <a:p>
+                  <a:pPr marL="457200" indent="-457200">
+                    <a:buFont typeface="Arial" panose="020B0604020202020204" pitchFamily="34" charset="0"/>
+                    <a:buChar char="•"/>
+                  </a:pPr>
+                  <a:endParaRPr lang="en-US" sz="2800" dirty="0">
+                    <a:solidFill>
+                      <a:schemeClr val="tx2">
+                        <a:lumMod val="50000"/>
+                      </a:schemeClr>
+                    </a:solidFill>
+                    <a:latin typeface="Oxygen" panose="02000503000000000000" pitchFamily="2" charset="0"/>
+                  </a:endParaRPr>
+                </a:p>
+              </p:txBody>
+            </p:sp>
+            <p:sp>
+              <p:nvSpPr>
+                <p:cNvPr id="102" name="TextBox 101"/>
+                <p:cNvSpPr txBox="1"/>
+                <p:nvPr/>
+              </p:nvSpPr>
+              <p:spPr>
+                <a:xfrm>
+                  <a:off x="1920228" y="12958607"/>
+                  <a:ext cx="6054542" cy="2954655"/>
+                </a:xfrm>
+                <a:prstGeom prst="rect">
+                  <a:avLst/>
+                </a:prstGeom>
+                <a:noFill/>
+              </p:spPr>
+              <p:txBody>
+                <a:bodyPr wrap="square" rtlCol="0">
+                  <a:spAutoFit/>
+                </a:bodyPr>
+                <a:lstStyle/>
+                <a:p>
+                  <a:r>
+                    <a:rPr lang="en-US" sz="2100" b="1" dirty="0">
+                      <a:solidFill>
+                        <a:schemeClr val="tx2">
+                          <a:lumMod val="50000"/>
+                        </a:schemeClr>
+                      </a:solidFill>
+                      <a:latin typeface="Oxygen" panose="02000503000000000000" pitchFamily="2" charset="0"/>
+                    </a:rPr>
+                    <a:t>Components: </a:t>
+                  </a:r>
+                  <a:r>
+                    <a:rPr lang="en-US" sz="2100" dirty="0">
+                      <a:solidFill>
+                        <a:schemeClr val="tx2">
+                          <a:lumMod val="50000"/>
+                        </a:schemeClr>
+                      </a:solidFill>
+                      <a:latin typeface="Oxygen" panose="02000503000000000000" pitchFamily="2" charset="0"/>
+                    </a:rPr>
+                    <a:t>elements that have some runtime presence (processes, objects, clients, servers).</a:t>
+                  </a:r>
+                </a:p>
+                <a:p>
+                  <a:r>
+                    <a:rPr lang="en-US" sz="2100" b="1" dirty="0">
+                      <a:solidFill>
+                        <a:schemeClr val="tx2">
+                          <a:lumMod val="50000"/>
+                        </a:schemeClr>
+                      </a:solidFill>
+                      <a:latin typeface="Oxygen" panose="02000503000000000000" pitchFamily="2" charset="0"/>
+                    </a:rPr>
+                    <a:t>Connectors: </a:t>
+                  </a:r>
+                  <a:r>
+                    <a:rPr lang="en-US" sz="2100" dirty="0">
+                      <a:solidFill>
+                        <a:schemeClr val="tx2">
+                          <a:lumMod val="50000"/>
+                        </a:schemeClr>
+                      </a:solidFill>
+                      <a:latin typeface="Oxygen" panose="02000503000000000000" pitchFamily="2" charset="0"/>
+                    </a:rPr>
+                    <a:t>components’ pathways of interaction (protocols, information flows).</a:t>
+                  </a:r>
+                  <a:endParaRPr lang="en-US" sz="2100" b="1" dirty="0">
+                    <a:solidFill>
+                      <a:schemeClr val="tx2">
+                        <a:lumMod val="50000"/>
+                      </a:schemeClr>
+                    </a:solidFill>
+                    <a:latin typeface="Oxygen" panose="02000503000000000000" pitchFamily="2" charset="0"/>
+                  </a:endParaRPr>
+                </a:p>
+                <a:p>
+                  <a:pPr marL="342900" indent="-342900">
+                    <a:buFont typeface="Arial" panose="020B0604020202020204" pitchFamily="34" charset="0"/>
+                    <a:buChar char="•"/>
+                  </a:pPr>
+                  <a:endParaRPr lang="en-US" sz="2300" dirty="0">
+                    <a:solidFill>
+                      <a:schemeClr val="tx2">
+                        <a:lumMod val="50000"/>
+                      </a:schemeClr>
+                    </a:solidFill>
+                    <a:latin typeface="Oxygen" panose="02000503000000000000" pitchFamily="2" charset="0"/>
+                  </a:endParaRPr>
+                </a:p>
+                <a:p>
+                  <a:pPr marL="342900" indent="-342900">
+                    <a:buFont typeface="Arial" panose="020B0604020202020204" pitchFamily="34" charset="0"/>
+                    <a:buChar char="•"/>
+                  </a:pPr>
+                  <a:endParaRPr lang="en-US" sz="2300" dirty="0">
+                    <a:solidFill>
+                      <a:schemeClr val="tx2">
+                        <a:lumMod val="50000"/>
+                      </a:schemeClr>
+                    </a:solidFill>
+                    <a:latin typeface="Oxygen" panose="02000503000000000000" pitchFamily="2" charset="0"/>
+                  </a:endParaRPr>
+                </a:p>
+                <a:p>
+                  <a:pPr marL="457200" indent="-457200">
+                    <a:buFont typeface="Arial" panose="020B0604020202020204" pitchFamily="34" charset="0"/>
+                    <a:buChar char="•"/>
+                  </a:pPr>
+                  <a:endParaRPr lang="en-US" sz="2800" dirty="0">
+                    <a:solidFill>
+                      <a:schemeClr val="tx2">
+                        <a:lumMod val="50000"/>
+                      </a:schemeClr>
+                    </a:solidFill>
+                    <a:latin typeface="Oxygen" panose="02000503000000000000" pitchFamily="2" charset="0"/>
+                  </a:endParaRPr>
+                </a:p>
+                <a:p>
+                  <a:endParaRPr lang="en-US" sz="2800" dirty="0">
+                    <a:solidFill>
+                      <a:schemeClr val="tx2">
+                        <a:lumMod val="50000"/>
+                      </a:schemeClr>
+                    </a:solidFill>
+                    <a:latin typeface="Oxygen" panose="02000503000000000000" pitchFamily="2" charset="0"/>
+                  </a:endParaRPr>
+                </a:p>
+              </p:txBody>
+            </p:sp>
+            <p:sp>
+              <p:nvSpPr>
+                <p:cNvPr id="103" name="TextBox 102"/>
+                <p:cNvSpPr txBox="1"/>
+                <p:nvPr/>
+              </p:nvSpPr>
+              <p:spPr>
+                <a:xfrm>
+                  <a:off x="2078260" y="17028094"/>
+                  <a:ext cx="4128615" cy="630942"/>
+                </a:xfrm>
+                <a:prstGeom prst="rect">
+                  <a:avLst/>
+                </a:prstGeom>
+                <a:noFill/>
+              </p:spPr>
+              <p:txBody>
+                <a:bodyPr wrap="square" rtlCol="0">
+                  <a:spAutoFit/>
+                </a:bodyPr>
+                <a:lstStyle/>
+                <a:p>
+                  <a:r>
+                    <a:rPr lang="en-US" sz="3500" dirty="0">
+                      <a:solidFill>
+                        <a:schemeClr val="tx2">
+                          <a:lumMod val="50000"/>
+                        </a:schemeClr>
+                      </a:solidFill>
+                      <a:latin typeface="Oxygen" panose="02000503000000000000" pitchFamily="2" charset="0"/>
+                    </a:rPr>
+                    <a:t>* poop</a:t>
+                  </a:r>
+                </a:p>
+              </p:txBody>
+            </p:sp>
+          </p:grpSp>
+        </p:grpSp>
       </p:grpSp>
     </p:spTree>
   </p:cSld>

</xml_diff>

<commit_message>
Added Previous Solutions text
Need to rearrange. Also the ArchJava section only has (-) bullet points [TODO].
</commit_message>
<xml_diff>
--- a/CMU REUSE 2017 Poster.pptx
+++ b/CMU REUSE 2017 Poster.pptx
@@ -5071,7 +5071,7 @@
             <p:spPr>
               <a:xfrm>
                 <a:off x="12547735" y="12805877"/>
-                <a:ext cx="5171176" cy="1938992"/>
+                <a:ext cx="5171176" cy="2862322"/>
               </a:xfrm>
               <a:prstGeom prst="rect">
                 <a:avLst/>
@@ -5089,7 +5089,7 @@
                   <a:rPr lang="en-US" sz="3000" dirty="0">
                     <a:latin typeface="Oxygen" panose="02000503000000000000" pitchFamily="2" charset="0"/>
                   </a:rPr>
-                  <a:t>Guarantees planned in software architecture design do not always carry through to implementations.</a:t>
+                  <a:t>It is hard to determine whether the logical relationships between entities in architecture diagrams are present in system implementations. </a:t>
                 </a:r>
               </a:p>
             </p:txBody>
@@ -5204,8 +5204,8 @@
         </p:nvSpPr>
         <p:spPr>
           <a:xfrm>
-            <a:off x="17951116" y="5036804"/>
-            <a:ext cx="11784151" cy="5880232"/>
+            <a:off x="17951116" y="5174748"/>
+            <a:ext cx="11784151" cy="5666549"/>
           </a:xfrm>
           <a:prstGeom prst="roundRect">
             <a:avLst/>
@@ -5239,8 +5239,58 @@
           <a:bodyPr rtlCol="0" anchor="ctr"/>
           <a:lstStyle/>
           <a:p>
+            <a:endParaRPr lang="en-US" sz="3200" b="1" dirty="0">
+              <a:solidFill>
+                <a:schemeClr val="tx2">
+                  <a:lumMod val="50000"/>
+                </a:schemeClr>
+              </a:solidFill>
+              <a:latin typeface="Oxygen" panose="02000503000000000000" pitchFamily="2" charset="0"/>
+            </a:endParaRPr>
+          </a:p>
+          <a:p>
+            <a:endParaRPr lang="en-US" sz="3200" b="1" dirty="0">
+              <a:solidFill>
+                <a:schemeClr val="tx2">
+                  <a:lumMod val="50000"/>
+                </a:schemeClr>
+              </a:solidFill>
+              <a:latin typeface="Oxygen" panose="02000503000000000000" pitchFamily="2" charset="0"/>
+            </a:endParaRPr>
+          </a:p>
+          <a:p>
+            <a:endParaRPr lang="en-US" sz="3200" b="1" dirty="0">
+              <a:solidFill>
+                <a:schemeClr val="tx2">
+                  <a:lumMod val="50000"/>
+                </a:schemeClr>
+              </a:solidFill>
+              <a:latin typeface="Oxygen" panose="02000503000000000000" pitchFamily="2" charset="0"/>
+            </a:endParaRPr>
+          </a:p>
+          <a:p>
+            <a:endParaRPr lang="en-US" sz="3200" b="1" dirty="0">
+              <a:solidFill>
+                <a:schemeClr val="tx2">
+                  <a:lumMod val="50000"/>
+                </a:schemeClr>
+              </a:solidFill>
+              <a:latin typeface="Oxygen" panose="02000503000000000000" pitchFamily="2" charset="0"/>
+            </a:endParaRPr>
+          </a:p>
+          <a:p>
+            <a:endParaRPr lang="en-US" sz="3200" b="1" dirty="0">
+              <a:solidFill>
+                <a:schemeClr val="tx2">
+                  <a:lumMod val="50000"/>
+                </a:schemeClr>
+              </a:solidFill>
+              <a:latin typeface="Oxygen" panose="02000503000000000000" pitchFamily="2" charset="0"/>
+            </a:endParaRPr>
+          </a:p>
+          <a:p>
             <a:r>
-              <a:rPr lang="en-US" sz="2800" dirty="0">
+              <a:rPr lang="en-US" sz="3200" b="1" dirty="0">
                 <a:solidFill>
                   <a:schemeClr val="tx2">
                     <a:lumMod val="50000"/>
@@ -5248,10 +5298,358 @@
                 </a:solidFill>
                 <a:latin typeface="Oxygen" panose="02000503000000000000" pitchFamily="2" charset="0"/>
               </a:rPr>
-              <a:t>Architecture Description Languages</a:t>
+              <a:t>Architecture Description Languages (ADLs)</a:t>
             </a:r>
           </a:p>
           <a:p>
+            <a:pPr marL="457200" indent="-457200">
+              <a:buFont typeface="Arial" panose="020B0604020202020204" pitchFamily="34" charset="0"/>
+              <a:buChar char="•"/>
+            </a:pPr>
+            <a:r>
+              <a:rPr lang="en-US" sz="2600" dirty="0">
+                <a:solidFill>
+                  <a:schemeClr val="tx2">
+                    <a:lumMod val="50000"/>
+                  </a:schemeClr>
+                </a:solidFill>
+                <a:latin typeface="Oxygen" panose="02000503000000000000" pitchFamily="2" charset="0"/>
+              </a:rPr>
+              <a:t>(-) </a:t>
+            </a:r>
+            <a:r>
+              <a:rPr lang="en-US" sz="2600" i="1" dirty="0">
+                <a:solidFill>
+                  <a:schemeClr val="tx2">
+                    <a:lumMod val="50000"/>
+                  </a:schemeClr>
+                </a:solidFill>
+                <a:latin typeface="Oxygen" panose="02000503000000000000" pitchFamily="2" charset="0"/>
+              </a:rPr>
+              <a:t>Description:</a:t>
+            </a:r>
+            <a:r>
+              <a:rPr lang="en-US" sz="2600" dirty="0">
+                <a:solidFill>
+                  <a:schemeClr val="tx2">
+                    <a:lumMod val="50000"/>
+                  </a:schemeClr>
+                </a:solidFill>
+                <a:latin typeface="Oxygen" panose="02000503000000000000" pitchFamily="2" charset="0"/>
+              </a:rPr>
+              <a:t>  Inferred by the name, ADLs only describe software architectures; they do not prescribe, or </a:t>
+            </a:r>
+            <a:r>
+              <a:rPr lang="en-US" sz="2600" b="1" dirty="0">
+                <a:solidFill>
+                  <a:schemeClr val="tx2">
+                    <a:lumMod val="50000"/>
+                  </a:schemeClr>
+                </a:solidFill>
+                <a:latin typeface="Oxygen" panose="02000503000000000000" pitchFamily="2" charset="0"/>
+              </a:rPr>
+              <a:t>enforce conformance</a:t>
+            </a:r>
+            <a:r>
+              <a:rPr lang="en-US" sz="2600" dirty="0">
+                <a:solidFill>
+                  <a:schemeClr val="tx2">
+                    <a:lumMod val="50000"/>
+                  </a:schemeClr>
+                </a:solidFill>
+                <a:latin typeface="Oxygen" panose="02000503000000000000" pitchFamily="2" charset="0"/>
+              </a:rPr>
+              <a:t> to them</a:t>
+            </a:r>
+          </a:p>
+          <a:p>
+            <a:pPr marL="457200" indent="-457200">
+              <a:buFont typeface="Arial" panose="020B0604020202020204" pitchFamily="34" charset="0"/>
+              <a:buChar char="•"/>
+            </a:pPr>
+            <a:r>
+              <a:rPr lang="en-US" sz="2600" dirty="0">
+                <a:solidFill>
+                  <a:schemeClr val="tx2">
+                    <a:lumMod val="50000"/>
+                  </a:schemeClr>
+                </a:solidFill>
+                <a:latin typeface="Oxygen" panose="02000503000000000000" pitchFamily="2" charset="0"/>
+              </a:rPr>
+              <a:t>(+) </a:t>
+            </a:r>
+            <a:r>
+              <a:rPr lang="en-US" sz="2600" i="1" dirty="0">
+                <a:solidFill>
+                  <a:schemeClr val="tx2">
+                    <a:lumMod val="50000"/>
+                  </a:schemeClr>
+                </a:solidFill>
+                <a:latin typeface="Oxygen" panose="02000503000000000000" pitchFamily="2" charset="0"/>
+              </a:rPr>
+              <a:t>Analysis: </a:t>
+            </a:r>
+            <a:r>
+              <a:rPr lang="en-US" sz="2600" dirty="0">
+                <a:solidFill>
+                  <a:schemeClr val="tx2">
+                    <a:lumMod val="50000"/>
+                  </a:schemeClr>
+                </a:solidFill>
+                <a:latin typeface="Oxygen" panose="02000503000000000000" pitchFamily="2" charset="0"/>
+              </a:rPr>
+              <a:t> ADLs are focused on system analyses</a:t>
+            </a:r>
+          </a:p>
+          <a:p>
+            <a:pPr marL="457200" indent="-457200">
+              <a:buFont typeface="Arial" panose="020B0604020202020204" pitchFamily="34" charset="0"/>
+              <a:buChar char="•"/>
+            </a:pPr>
+            <a:r>
+              <a:rPr lang="en-US" sz="2600" dirty="0">
+                <a:solidFill>
+                  <a:schemeClr val="tx2">
+                    <a:lumMod val="50000"/>
+                  </a:schemeClr>
+                </a:solidFill>
+                <a:latin typeface="Oxygen" panose="02000503000000000000" pitchFamily="2" charset="0"/>
+              </a:rPr>
+              <a:t>(+)</a:t>
+            </a:r>
+            <a:r>
+              <a:rPr lang="en-US" sz="2600" i="1" dirty="0">
+                <a:solidFill>
+                  <a:schemeClr val="tx2">
+                    <a:lumMod val="50000"/>
+                  </a:schemeClr>
+                </a:solidFill>
+                <a:latin typeface="Oxygen" panose="02000503000000000000" pitchFamily="2" charset="0"/>
+              </a:rPr>
+              <a:t> Formal Notation:  </a:t>
+            </a:r>
+            <a:r>
+              <a:rPr lang="en-US" sz="2600" dirty="0">
+                <a:solidFill>
+                  <a:schemeClr val="tx2">
+                    <a:lumMod val="50000"/>
+                  </a:schemeClr>
+                </a:solidFill>
+                <a:latin typeface="Oxygen" panose="02000503000000000000" pitchFamily="2" charset="0"/>
+              </a:rPr>
+              <a:t>Currently, ADLs are the most formal  mainstream architecture tools available</a:t>
+            </a:r>
+          </a:p>
+          <a:p>
+            <a:pPr marL="457200" indent="-457200">
+              <a:buFont typeface="Arial" panose="020B0604020202020204" pitchFamily="34" charset="0"/>
+              <a:buChar char="•"/>
+            </a:pPr>
+            <a:endParaRPr lang="en-US" sz="3200" b="1" dirty="0">
+              <a:solidFill>
+                <a:schemeClr val="tx2">
+                  <a:lumMod val="50000"/>
+                </a:schemeClr>
+              </a:solidFill>
+              <a:latin typeface="Oxygen" panose="02000503000000000000" pitchFamily="2" charset="0"/>
+            </a:endParaRPr>
+          </a:p>
+          <a:p>
+            <a:r>
+              <a:rPr lang="en-US" sz="3200" b="1" dirty="0">
+                <a:solidFill>
+                  <a:schemeClr val="tx2">
+                    <a:lumMod val="50000"/>
+                  </a:schemeClr>
+                </a:solidFill>
+                <a:latin typeface="Oxygen" panose="02000503000000000000" pitchFamily="2" charset="0"/>
+              </a:rPr>
+              <a:t>ArchJava   </a:t>
+            </a:r>
+            <a:r>
+              <a:rPr lang="en-US" sz="3200" dirty="0">
+                <a:solidFill>
+                  <a:schemeClr val="tx2">
+                    <a:lumMod val="50000"/>
+                  </a:schemeClr>
+                </a:solidFill>
+                <a:latin typeface="Oxygen" panose="02000503000000000000" pitchFamily="2" charset="0"/>
+              </a:rPr>
+              <a:t>Java extension unifying SWA and implementation</a:t>
+            </a:r>
+            <a:endParaRPr lang="en-US" sz="3200" b="1" dirty="0">
+              <a:solidFill>
+                <a:schemeClr val="tx2">
+                  <a:lumMod val="50000"/>
+                </a:schemeClr>
+              </a:solidFill>
+              <a:latin typeface="Oxygen" panose="02000503000000000000" pitchFamily="2" charset="0"/>
+            </a:endParaRPr>
+          </a:p>
+          <a:p>
+            <a:pPr marL="457200" indent="-457200">
+              <a:buFont typeface="Arial" panose="020B0604020202020204" pitchFamily="34" charset="0"/>
+              <a:buChar char="•"/>
+            </a:pPr>
+            <a:r>
+              <a:rPr lang="en-US" sz="2600" dirty="0">
+                <a:solidFill>
+                  <a:schemeClr val="tx2">
+                    <a:lumMod val="50000"/>
+                  </a:schemeClr>
+                </a:solidFill>
+                <a:latin typeface="Oxygen" panose="02000503000000000000" pitchFamily="2" charset="0"/>
+              </a:rPr>
+              <a:t>(-) </a:t>
+            </a:r>
+            <a:r>
+              <a:rPr lang="en-US" sz="2600" i="1" dirty="0">
+                <a:solidFill>
+                  <a:schemeClr val="tx2">
+                    <a:lumMod val="50000"/>
+                  </a:schemeClr>
+                </a:solidFill>
+                <a:latin typeface="Oxygen" panose="02000503000000000000" pitchFamily="2" charset="0"/>
+              </a:rPr>
+              <a:t>Application:</a:t>
+            </a:r>
+            <a:r>
+              <a:rPr lang="en-US" sz="2600" dirty="0">
+                <a:solidFill>
+                  <a:schemeClr val="tx2">
+                    <a:lumMod val="50000"/>
+                  </a:schemeClr>
+                </a:solidFill>
+                <a:latin typeface="Oxygen" panose="02000503000000000000" pitchFamily="2" charset="0"/>
+              </a:rPr>
+              <a:t>  Does not do anything interesting with SWA (i.e. checks)</a:t>
+            </a:r>
+          </a:p>
+          <a:p>
+            <a:pPr marL="457200" indent="-457200">
+              <a:buFont typeface="Arial" panose="020B0604020202020204" pitchFamily="34" charset="0"/>
+              <a:buChar char="•"/>
+            </a:pPr>
+            <a:r>
+              <a:rPr lang="en-US" sz="2600" dirty="0">
+                <a:solidFill>
+                  <a:schemeClr val="tx2">
+                    <a:lumMod val="50000"/>
+                  </a:schemeClr>
+                </a:solidFill>
+                <a:latin typeface="Oxygen" panose="02000503000000000000" pitchFamily="2" charset="0"/>
+              </a:rPr>
+              <a:t>(-) </a:t>
+            </a:r>
+            <a:r>
+              <a:rPr lang="en-US" sz="2600" i="1" dirty="0">
+                <a:solidFill>
+                  <a:schemeClr val="tx2">
+                    <a:lumMod val="50000"/>
+                  </a:schemeClr>
+                </a:solidFill>
+                <a:latin typeface="Oxygen" panose="02000503000000000000" pitchFamily="2" charset="0"/>
+              </a:rPr>
+              <a:t>Distributed Systems:  </a:t>
+            </a:r>
+            <a:r>
+              <a:rPr lang="en-US" sz="2600" dirty="0">
+                <a:solidFill>
+                  <a:schemeClr val="tx2">
+                    <a:lumMod val="50000"/>
+                  </a:schemeClr>
+                </a:solidFill>
+                <a:latin typeface="Oxygen" panose="02000503000000000000" pitchFamily="2" charset="0"/>
+              </a:rPr>
+              <a:t>No support for distributed systems</a:t>
+            </a:r>
+          </a:p>
+          <a:p>
+            <a:pPr marL="457200" indent="-457200">
+              <a:buFont typeface="Arial" panose="020B0604020202020204" pitchFamily="34" charset="0"/>
+              <a:buChar char="•"/>
+            </a:pPr>
+            <a:r>
+              <a:rPr lang="en-US" sz="2600" dirty="0">
+                <a:solidFill>
+                  <a:schemeClr val="tx2">
+                    <a:lumMod val="50000"/>
+                  </a:schemeClr>
+                </a:solidFill>
+                <a:latin typeface="Oxygen" panose="02000503000000000000" pitchFamily="2" charset="0"/>
+              </a:rPr>
+              <a:t>(-) </a:t>
+            </a:r>
+            <a:r>
+              <a:rPr lang="en-US" sz="2600" i="1" dirty="0">
+                <a:solidFill>
+                  <a:schemeClr val="tx2">
+                    <a:lumMod val="50000"/>
+                  </a:schemeClr>
+                </a:solidFill>
+                <a:latin typeface="Oxygen" panose="02000503000000000000" pitchFamily="2" charset="0"/>
+              </a:rPr>
+              <a:t>Multiple SWA Views:</a:t>
+            </a:r>
+            <a:r>
+              <a:rPr lang="en-US" sz="2600" dirty="0">
+                <a:solidFill>
+                  <a:schemeClr val="tx2">
+                    <a:lumMod val="50000"/>
+                  </a:schemeClr>
+                </a:solidFill>
+                <a:latin typeface="Oxygen" panose="02000503000000000000" pitchFamily="2" charset="0"/>
+              </a:rPr>
+              <a:t>  Lacks support for multiple architecture views; focuses only on Component-and-Connector view.</a:t>
+            </a:r>
+          </a:p>
+          <a:p>
+            <a:pPr marL="457200" indent="-457200">
+              <a:buFont typeface="Arial" panose="020B0604020202020204" pitchFamily="34" charset="0"/>
+              <a:buChar char="•"/>
+            </a:pPr>
+            <a:endParaRPr lang="en-US" sz="2600" dirty="0">
+              <a:solidFill>
+                <a:schemeClr val="tx2">
+                  <a:lumMod val="50000"/>
+                </a:schemeClr>
+              </a:solidFill>
+              <a:latin typeface="Oxygen" panose="02000503000000000000" pitchFamily="2" charset="0"/>
+            </a:endParaRPr>
+          </a:p>
+          <a:p>
+            <a:pPr marL="457200" indent="-457200" algn="r">
+              <a:buFont typeface="Arial" panose="020B0604020202020204" pitchFamily="34" charset="0"/>
+              <a:buChar char="•"/>
+            </a:pPr>
+            <a:endParaRPr lang="en-US" sz="3200" b="1" dirty="0">
+              <a:solidFill>
+                <a:schemeClr val="tx2">
+                  <a:lumMod val="50000"/>
+                </a:schemeClr>
+              </a:solidFill>
+              <a:latin typeface="Oxygen" panose="02000503000000000000" pitchFamily="2" charset="0"/>
+            </a:endParaRPr>
+          </a:p>
+          <a:p>
+            <a:pPr marL="457200" indent="-457200">
+              <a:buFont typeface="Arial" panose="020B0604020202020204" pitchFamily="34" charset="0"/>
+              <a:buChar char="•"/>
+            </a:pPr>
+            <a:endParaRPr lang="en-US" sz="2600" dirty="0">
+              <a:solidFill>
+                <a:schemeClr val="tx2">
+                  <a:lumMod val="50000"/>
+                </a:schemeClr>
+              </a:solidFill>
+              <a:latin typeface="Oxygen" panose="02000503000000000000" pitchFamily="2" charset="0"/>
+            </a:endParaRPr>
+          </a:p>
+          <a:p>
+            <a:pPr marL="457200" indent="-457200">
+              <a:buFont typeface="Arial" panose="020B0604020202020204" pitchFamily="34" charset="0"/>
+              <a:buChar char="•"/>
+            </a:pPr>
             <a:endParaRPr lang="en-US" sz="2800" dirty="0">
               <a:solidFill>
                 <a:schemeClr val="tx2">
@@ -5262,38 +5660,7 @@
             </a:endParaRPr>
           </a:p>
           <a:p>
-            <a:endParaRPr lang="en-US" sz="2800" dirty="0">
-              <a:solidFill>
-                <a:schemeClr val="tx2">
-                  <a:lumMod val="50000"/>
-                </a:schemeClr>
-              </a:solidFill>
-              <a:latin typeface="Oxygen" panose="02000503000000000000" pitchFamily="2" charset="0"/>
-            </a:endParaRPr>
-          </a:p>
-          <a:p>
-            <a:r>
-              <a:rPr lang="en-US" sz="2800" dirty="0" err="1">
-                <a:solidFill>
-                  <a:schemeClr val="tx2">
-                    <a:lumMod val="50000"/>
-                  </a:schemeClr>
-                </a:solidFill>
-                <a:latin typeface="Oxygen" panose="02000503000000000000" pitchFamily="2" charset="0"/>
-              </a:rPr>
-              <a:t>ArchJava</a:t>
-            </a:r>
-            <a:endParaRPr lang="en-US" sz="2800" dirty="0">
-              <a:solidFill>
-                <a:schemeClr val="tx2">
-                  <a:lumMod val="50000"/>
-                </a:schemeClr>
-              </a:solidFill>
-              <a:latin typeface="Oxygen" panose="02000503000000000000" pitchFamily="2" charset="0"/>
-            </a:endParaRPr>
-          </a:p>
-          <a:p>
-            <a:endParaRPr lang="en-US" sz="2800" dirty="0">
+            <a:endParaRPr lang="en-US" sz="2800" b="1" dirty="0">
               <a:solidFill>
                 <a:schemeClr val="tx2">
                   <a:lumMod val="50000"/>

</xml_diff>

<commit_message>
Beta "Trinity's Approach" text
Switch sizes of Trinity's Approach and "Previous Solutions"??
</commit_message>
<xml_diff>
--- a/CMU REUSE 2017 Poster.pptx
+++ b/CMU REUSE 2017 Poster.pptx
@@ -5714,8 +5714,12 @@
           <a:bodyPr rtlCol="0" anchor="ctr"/>
           <a:lstStyle/>
           <a:p>
+            <a:pPr marL="457200" indent="-457200">
+              <a:buFont typeface="Arial" panose="020B0604020202020204" pitchFamily="34" charset="0"/>
+              <a:buChar char="•"/>
+            </a:pPr>
             <a:r>
-              <a:rPr lang="en-US" sz="3000" dirty="0">
+              <a:rPr lang="en-US" sz="2800" dirty="0">
                 <a:solidFill>
                   <a:schemeClr val="tx2">
                     <a:lumMod val="50000"/>
@@ -5723,7 +5727,196 @@
                 </a:solidFill>
                 <a:latin typeface="Oxygen" panose="02000503000000000000" pitchFamily="2" charset="0"/>
               </a:rPr>
-              <a:t>Readability, Conformance(?), Communication Integrity, SWA as a live component, 3 SWA views</a:t>
+              <a:t>Makes software architecture a </a:t>
+            </a:r>
+            <a:r>
+              <a:rPr lang="en-US" sz="2800" b="1" dirty="0">
+                <a:solidFill>
+                  <a:schemeClr val="tx2">
+                    <a:lumMod val="50000"/>
+                  </a:schemeClr>
+                </a:solidFill>
+                <a:latin typeface="Oxygen" panose="02000503000000000000" pitchFamily="2" charset="0"/>
+              </a:rPr>
+              <a:t>"live" component </a:t>
+            </a:r>
+            <a:r>
+              <a:rPr lang="en-US" sz="2800" dirty="0">
+                <a:solidFill>
+                  <a:schemeClr val="tx2">
+                    <a:lumMod val="50000"/>
+                  </a:schemeClr>
+                </a:solidFill>
+                <a:latin typeface="Oxygen" panose="02000503000000000000" pitchFamily="2" charset="0"/>
+              </a:rPr>
+              <a:t>of Trinity systems</a:t>
+            </a:r>
+          </a:p>
+          <a:p>
+            <a:pPr marL="457200" indent="-457200">
+              <a:buFont typeface="Arial" panose="020B0604020202020204" pitchFamily="34" charset="0"/>
+              <a:buChar char="•"/>
+            </a:pPr>
+            <a:r>
+              <a:rPr lang="en-US" sz="2800" dirty="0">
+                <a:solidFill>
+                  <a:schemeClr val="tx2">
+                    <a:lumMod val="50000"/>
+                  </a:schemeClr>
+                </a:solidFill>
+                <a:latin typeface="Oxygen" panose="02000503000000000000" pitchFamily="2" charset="0"/>
+              </a:rPr>
+              <a:t>Trinity enforced </a:t>
+            </a:r>
+            <a:r>
+              <a:rPr lang="en-US" sz="2800" b="1" dirty="0">
+                <a:solidFill>
+                  <a:schemeClr val="tx2">
+                    <a:lumMod val="50000"/>
+                  </a:schemeClr>
+                </a:solidFill>
+                <a:latin typeface="Oxygen" panose="02000503000000000000" pitchFamily="2" charset="0"/>
+              </a:rPr>
+              <a:t>architecture conformance </a:t>
+            </a:r>
+            <a:r>
+              <a:rPr lang="en-US" sz="2800" dirty="0">
+                <a:solidFill>
+                  <a:schemeClr val="tx2">
+                    <a:lumMod val="50000"/>
+                  </a:schemeClr>
+                </a:solidFill>
+                <a:latin typeface="Oxygen" panose="02000503000000000000" pitchFamily="2" charset="0"/>
+              </a:rPr>
+              <a:t>complements ADL analyses</a:t>
+            </a:r>
+          </a:p>
+          <a:p>
+            <a:pPr marL="457200" indent="-457200">
+              <a:buFont typeface="Arial" panose="020B0604020202020204" pitchFamily="34" charset="0"/>
+              <a:buChar char="•"/>
+            </a:pPr>
+            <a:r>
+              <a:rPr lang="en-US" sz="2800" dirty="0">
+                <a:solidFill>
+                  <a:schemeClr val="tx2">
+                    <a:lumMod val="50000"/>
+                  </a:schemeClr>
+                </a:solidFill>
+                <a:latin typeface="Oxygen" panose="02000503000000000000" pitchFamily="2" charset="0"/>
+              </a:rPr>
+              <a:t>Directly translate the conceptual entities from SWA views into </a:t>
+            </a:r>
+            <a:r>
+              <a:rPr lang="en-US" sz="2800" b="1" dirty="0">
+                <a:solidFill>
+                  <a:schemeClr val="tx2">
+                    <a:lumMod val="50000"/>
+                  </a:schemeClr>
+                </a:solidFill>
+                <a:latin typeface="Oxygen" panose="02000503000000000000" pitchFamily="2" charset="0"/>
+              </a:rPr>
+              <a:t>code-enforced constructs</a:t>
+            </a:r>
+          </a:p>
+          <a:p>
+            <a:pPr marL="457200" lvl="2" indent="-457200">
+              <a:buFont typeface="Arial" panose="020B0604020202020204" pitchFamily="34" charset="0"/>
+              <a:buChar char="•"/>
+            </a:pPr>
+            <a:r>
+              <a:rPr lang="en-US" sz="2800" dirty="0">
+                <a:solidFill>
+                  <a:schemeClr val="tx2">
+                    <a:lumMod val="50000"/>
+                  </a:schemeClr>
+                </a:solidFill>
+                <a:latin typeface="Oxygen" panose="02000503000000000000" pitchFamily="2" charset="0"/>
+              </a:rPr>
+              <a:t>Support for </a:t>
+            </a:r>
+            <a:r>
+              <a:rPr lang="en-US" sz="2800" b="1" dirty="0">
+                <a:solidFill>
+                  <a:schemeClr val="tx2">
+                    <a:lumMod val="50000"/>
+                  </a:schemeClr>
+                </a:solidFill>
+                <a:latin typeface="Oxygen" panose="02000503000000000000" pitchFamily="2" charset="0"/>
+              </a:rPr>
+              <a:t>all three software architecture views </a:t>
+            </a:r>
+            <a:r>
+              <a:rPr lang="en-US" sz="2800" dirty="0">
+                <a:solidFill>
+                  <a:schemeClr val="tx2">
+                    <a:lumMod val="50000"/>
+                  </a:schemeClr>
+                </a:solidFill>
+                <a:latin typeface="Oxygen" panose="02000503000000000000" pitchFamily="2" charset="0"/>
+              </a:rPr>
+              <a:t>(module or code, </a:t>
+            </a:r>
+            <a:r>
+              <a:rPr lang="en-US" sz="2800" dirty="0" err="1">
+                <a:solidFill>
+                  <a:schemeClr val="tx2">
+                    <a:lumMod val="50000"/>
+                  </a:schemeClr>
+                </a:solidFill>
+                <a:latin typeface="Oxygen" panose="02000503000000000000" pitchFamily="2" charset="0"/>
+              </a:rPr>
+              <a:t>CnC</a:t>
+            </a:r>
+            <a:r>
+              <a:rPr lang="en-US" sz="2800" dirty="0">
+                <a:solidFill>
+                  <a:schemeClr val="tx2">
+                    <a:lumMod val="50000"/>
+                  </a:schemeClr>
+                </a:solidFill>
+                <a:latin typeface="Oxygen" panose="02000503000000000000" pitchFamily="2" charset="0"/>
+              </a:rPr>
+              <a:t>, and deployment).</a:t>
+            </a:r>
+          </a:p>
+          <a:p>
+            <a:pPr marL="457200" indent="-457200">
+              <a:buFont typeface="Arial" panose="020B0604020202020204" pitchFamily="34" charset="0"/>
+              <a:buChar char="•"/>
+            </a:pPr>
+            <a:r>
+              <a:rPr lang="en-US" sz="2800" dirty="0">
+                <a:solidFill>
+                  <a:schemeClr val="tx2">
+                    <a:lumMod val="50000"/>
+                  </a:schemeClr>
+                </a:solidFill>
+                <a:latin typeface="Oxygen" panose="02000503000000000000" pitchFamily="2" charset="0"/>
+              </a:rPr>
+              <a:t>Support for architecture conformance in </a:t>
+            </a:r>
+            <a:r>
+              <a:rPr lang="en-US" sz="2800" b="1" dirty="0">
+                <a:solidFill>
+                  <a:schemeClr val="tx2">
+                    <a:lumMod val="50000"/>
+                  </a:schemeClr>
+                </a:solidFill>
+                <a:latin typeface="Oxygen" panose="02000503000000000000" pitchFamily="2" charset="0"/>
+              </a:rPr>
+              <a:t>distributed systems</a:t>
+            </a:r>
+            <a:r>
+              <a:rPr lang="en-US" sz="2800" dirty="0">
+                <a:solidFill>
+                  <a:schemeClr val="tx2">
+                    <a:lumMod val="50000"/>
+                  </a:schemeClr>
+                </a:solidFill>
+                <a:latin typeface="Oxygen" panose="02000503000000000000" pitchFamily="2" charset="0"/>
+              </a:rPr>
+              <a:t>.</a:t>
             </a:r>
           </a:p>
         </p:txBody>
@@ -6022,9 +6215,9 @@
         <p:grpSpPr>
           <a:xfrm>
             <a:off x="659567" y="8095201"/>
-            <a:ext cx="10194379" cy="12083053"/>
+            <a:ext cx="10194379" cy="12179305"/>
             <a:chOff x="659567" y="8095201"/>
-            <a:chExt cx="10194379" cy="12083053"/>
+            <a:chExt cx="10194379" cy="12179305"/>
           </a:xfrm>
         </p:grpSpPr>
         <p:sp>
@@ -6076,9 +6269,9 @@
           <p:grpSpPr>
             <a:xfrm>
               <a:off x="659567" y="8956974"/>
-              <a:ext cx="10194379" cy="11221280"/>
+              <a:ext cx="10194379" cy="11317532"/>
               <a:chOff x="659567" y="8956974"/>
-              <a:chExt cx="10194379" cy="11221280"/>
+              <a:chExt cx="10194379" cy="11317532"/>
             </a:xfrm>
           </p:grpSpPr>
           <p:sp>
@@ -6523,9 +6716,9 @@
             <p:grpSpPr>
               <a:xfrm>
                 <a:off x="659567" y="8956974"/>
-                <a:ext cx="10194379" cy="11221280"/>
+                <a:ext cx="10194379" cy="11317532"/>
                 <a:chOff x="659567" y="8956974"/>
-                <a:chExt cx="10194379" cy="11221280"/>
+                <a:chExt cx="10194379" cy="11317532"/>
               </a:xfrm>
             </p:grpSpPr>
             <p:grpSp>
@@ -7401,7 +7594,7 @@
               </p:nvSpPr>
               <p:spPr>
                 <a:xfrm>
-                  <a:off x="1841806" y="16777323"/>
+                  <a:off x="1841806" y="16873575"/>
                   <a:ext cx="5937816" cy="3400931"/>
                 </a:xfrm>
                 <a:prstGeom prst="rect">

</xml_diff>

<commit_message>
Design + Example section outlines
</commit_message>
<xml_diff>
--- a/CMU REUSE 2017 Poster.pptx
+++ b/CMU REUSE 2017 Poster.pptx
@@ -4638,7 +4638,7 @@
           <a:lstStyle/>
           <a:p>
             <a:pPr algn="ctr"/>
-            <a:endParaRPr lang="en-US"/>
+            <a:endParaRPr lang="en-US" dirty="0"/>
           </a:p>
         </p:txBody>
       </p:sp>
@@ -5170,7 +5170,7 @@
           <p:spPr>
             <a:xfrm>
               <a:off x="-16462" y="4129408"/>
-              <a:ext cx="9073037" cy="1092607"/>
+              <a:ext cx="9073037" cy="1092608"/>
             </a:xfrm>
             <a:prstGeom prst="rect">
               <a:avLst/>
@@ -5445,7 +5445,7 @@
               <a:buFont typeface="Arial" panose="020B0604020202020204" pitchFamily="34" charset="0"/>
               <a:buChar char="•"/>
             </a:pPr>
-            <a:endParaRPr lang="en-US" sz="3200" b="1" dirty="0">
+            <a:endParaRPr lang="en-US" sz="3100" b="1" dirty="0">
               <a:solidFill>
                 <a:schemeClr val="tx2">
                   <a:lumMod val="50000"/>
@@ -5456,7 +5456,7 @@
           </a:p>
           <a:p>
             <a:r>
-              <a:rPr lang="en-US" sz="3200" b="1" dirty="0">
+              <a:rPr lang="en-US" sz="3100" b="1" dirty="0">
                 <a:solidFill>
                   <a:schemeClr val="tx2">
                     <a:lumMod val="50000"/>
@@ -5467,7 +5467,7 @@
               <a:t>ArchJava   </a:t>
             </a:r>
             <a:r>
-              <a:rPr lang="en-US" sz="3200" dirty="0">
+              <a:rPr lang="en-US" sz="3100" dirty="0">
                 <a:solidFill>
                   <a:schemeClr val="tx2">
                     <a:lumMod val="50000"/>
@@ -5477,7 +5477,7 @@
               </a:rPr>
               <a:t>Java extension unifying SWA and implementation</a:t>
             </a:r>
-            <a:endParaRPr lang="en-US" sz="3200" b="1" dirty="0">
+            <a:endParaRPr lang="en-US" sz="3100" b="1" dirty="0">
               <a:solidFill>
                 <a:schemeClr val="tx2">
                   <a:lumMod val="50000"/>
@@ -5713,6 +5713,20 @@
         <p:txBody>
           <a:bodyPr rtlCol="0" anchor="ctr"/>
           <a:lstStyle/>
+          <a:p>
+            <a:pPr marL="457200" indent="-457200">
+              <a:buFont typeface="Arial" panose="020B0604020202020204" pitchFamily="34" charset="0"/>
+              <a:buChar char="•"/>
+            </a:pPr>
+            <a:endParaRPr lang="en-US" sz="2800" dirty="0">
+              <a:solidFill>
+                <a:schemeClr val="tx2">
+                  <a:lumMod val="50000"/>
+                </a:schemeClr>
+              </a:solidFill>
+              <a:latin typeface="Oxygen" panose="02000503000000000000" pitchFamily="2" charset="0"/>
+            </a:endParaRPr>
+          </a:p>
           <a:p>
             <a:pPr marL="457200" indent="-457200">
               <a:buFont typeface="Arial" panose="020B0604020202020204" pitchFamily="34" charset="0"/>
@@ -6169,7 +6183,7 @@
         </p:nvSpPr>
         <p:spPr>
           <a:xfrm>
-            <a:off x="5233896" y="6047636"/>
+            <a:off x="5496801" y="6047712"/>
             <a:ext cx="12478917" cy="1938992"/>
           </a:xfrm>
           <a:prstGeom prst="rect">
@@ -6214,10 +6228,10 @@
         </p:nvGrpSpPr>
         <p:grpSpPr>
           <a:xfrm>
-            <a:off x="659567" y="8095201"/>
-            <a:ext cx="10194379" cy="12179305"/>
-            <a:chOff x="659567" y="8095201"/>
-            <a:chExt cx="10194379" cy="12179305"/>
+            <a:off x="719899" y="8095201"/>
+            <a:ext cx="10134047" cy="12179305"/>
+            <a:chOff x="719899" y="8095201"/>
+            <a:chExt cx="10134047" cy="12179305"/>
           </a:xfrm>
         </p:grpSpPr>
         <p:sp>
@@ -6268,10 +6282,10 @@
           </p:nvGrpSpPr>
           <p:grpSpPr>
             <a:xfrm>
-              <a:off x="659567" y="8956974"/>
-              <a:ext cx="10194379" cy="11317532"/>
-              <a:chOff x="659567" y="8956974"/>
-              <a:chExt cx="10194379" cy="11317532"/>
+              <a:off x="719899" y="8956974"/>
+              <a:ext cx="10134047" cy="11317532"/>
+              <a:chOff x="719899" y="8956974"/>
+              <a:chExt cx="10134047" cy="11317532"/>
             </a:xfrm>
           </p:grpSpPr>
           <p:sp>
@@ -6715,10 +6729,10 @@
             </p:nvGrpSpPr>
             <p:grpSpPr>
               <a:xfrm>
-                <a:off x="659567" y="8956974"/>
-                <a:ext cx="10194379" cy="11317532"/>
-                <a:chOff x="659567" y="8956974"/>
-                <a:chExt cx="10194379" cy="11317532"/>
+                <a:off x="719899" y="8956974"/>
+                <a:ext cx="10134047" cy="11317532"/>
+                <a:chOff x="719899" y="8956974"/>
+                <a:chExt cx="10134047" cy="11317532"/>
               </a:xfrm>
             </p:grpSpPr>
             <p:grpSp>
@@ -6729,10 +6743,10 @@
               </p:nvGrpSpPr>
               <p:grpSpPr>
                 <a:xfrm>
-                  <a:off x="659567" y="8956974"/>
-                  <a:ext cx="10194379" cy="10881629"/>
-                  <a:chOff x="1577981" y="5906435"/>
-                  <a:chExt cx="9011111" cy="13240385"/>
+                  <a:off x="719899" y="8956974"/>
+                  <a:ext cx="10134047" cy="10881629"/>
+                  <a:chOff x="1631310" y="5906435"/>
+                  <a:chExt cx="8957782" cy="13240385"/>
                 </a:xfrm>
               </p:grpSpPr>
               <p:grpSp>
@@ -6743,10 +6757,10 @@
                 </p:nvGrpSpPr>
                 <p:grpSpPr>
                   <a:xfrm>
-                    <a:off x="1577981" y="5906435"/>
-                    <a:ext cx="7770353" cy="13240385"/>
-                    <a:chOff x="1467478" y="5729527"/>
-                    <a:chExt cx="7770353" cy="13240385"/>
+                    <a:off x="1631310" y="5906435"/>
+                    <a:ext cx="7717024" cy="13240385"/>
+                    <a:chOff x="1520807" y="5729527"/>
+                    <a:chExt cx="7717024" cy="13240385"/>
                   </a:xfrm>
                 </p:grpSpPr>
                 <p:grpSp>
@@ -6757,10 +6771,10 @@
                   </p:nvGrpSpPr>
                   <p:grpSpPr>
                     <a:xfrm>
-                      <a:off x="1467478" y="5729527"/>
-                      <a:ext cx="7770353" cy="13240382"/>
-                      <a:chOff x="1467478" y="5729527"/>
-                      <a:chExt cx="7770353" cy="13240382"/>
+                      <a:off x="1520807" y="5729527"/>
+                      <a:ext cx="7717024" cy="13240382"/>
+                      <a:chOff x="1520807" y="5729527"/>
+                      <a:chExt cx="7717024" cy="13240382"/>
                     </a:xfrm>
                   </p:grpSpPr>
                   <p:grpSp>
@@ -7178,8 +7192,8 @@
                     </p:nvSpPr>
                     <p:spPr>
                       <a:xfrm rot="16200000">
-                        <a:off x="123841" y="11942212"/>
-                        <a:ext cx="3639460" cy="952185"/>
+                        <a:off x="20358" y="11785324"/>
+                        <a:ext cx="4022220" cy="952185"/>
                       </a:xfrm>
                       <a:prstGeom prst="rect">
                         <a:avLst/>
@@ -7196,16 +7210,19 @@
                           <a:rPr lang="en-US" sz="3200" dirty="0">
                             <a:latin typeface="Oxygen" panose="02000503000000000000" pitchFamily="2" charset="0"/>
                           </a:rPr>
-                          <a:t>Component </a:t>
+                          <a:t>Component and Connector (</a:t>
                         </a:r>
-                      </a:p>
-                      <a:p>
-                        <a:pPr algn="ctr"/>
+                        <a:r>
+                          <a:rPr lang="en-US" sz="3200" dirty="0" err="1">
+                            <a:latin typeface="Oxygen" panose="02000503000000000000" pitchFamily="2" charset="0"/>
+                          </a:rPr>
+                          <a:t>CnC</a:t>
+                        </a:r>
                         <a:r>
                           <a:rPr lang="en-US" sz="3200" dirty="0">
                             <a:latin typeface="Oxygen" panose="02000503000000000000" pitchFamily="2" charset="0"/>
                           </a:rPr>
-                          <a:t>and Connector</a:t>
+                          <a:t>)</a:t>
                         </a:r>
                       </a:p>
                     </p:txBody>
@@ -7779,6 +7796,422 @@
           </p:grpSp>
         </p:grpSp>
       </p:grpSp>
+      <p:sp>
+        <p:nvSpPr>
+          <p:cNvPr id="119" name="TextBox 118"/>
+          <p:cNvSpPr txBox="1"/>
+          <p:nvPr/>
+        </p:nvSpPr>
+        <p:spPr>
+          <a:xfrm>
+            <a:off x="759006" y="23129086"/>
+            <a:ext cx="10598612" cy="4247317"/>
+          </a:xfrm>
+          <a:prstGeom prst="rect">
+            <a:avLst/>
+          </a:prstGeom>
+          <a:noFill/>
+        </p:spPr>
+        <p:txBody>
+          <a:bodyPr wrap="square" rtlCol="0">
+            <a:spAutoFit/>
+          </a:bodyPr>
+          <a:lstStyle/>
+          <a:p>
+            <a:r>
+              <a:rPr lang="en-US" sz="3000" i="1" dirty="0">
+                <a:solidFill>
+                  <a:schemeClr val="accent1">
+                    <a:lumMod val="75000"/>
+                  </a:schemeClr>
+                </a:solidFill>
+                <a:latin typeface="Oxygen" panose="02000503000000000000" pitchFamily="2" charset="0"/>
+              </a:rPr>
+              <a:t>Architecture concepts are runtime entities in Trinity</a:t>
+            </a:r>
+            <a:endParaRPr lang="en-US" sz="3000" dirty="0">
+              <a:solidFill>
+                <a:schemeClr val="accent1">
+                  <a:lumMod val="75000"/>
+                </a:schemeClr>
+              </a:solidFill>
+              <a:latin typeface="Oxygen" panose="02000503000000000000" pitchFamily="2" charset="0"/>
+            </a:endParaRPr>
+          </a:p>
+          <a:p>
+            <a:endParaRPr lang="en-US" sz="3000" i="1" dirty="0">
+              <a:solidFill>
+                <a:schemeClr val="accent1">
+                  <a:lumMod val="75000"/>
+                </a:schemeClr>
+              </a:solidFill>
+              <a:latin typeface="Oxygen" panose="02000503000000000000" pitchFamily="2" charset="0"/>
+            </a:endParaRPr>
+          </a:p>
+          <a:p>
+            <a:endParaRPr lang="en-US" sz="3000" i="1" dirty="0">
+              <a:solidFill>
+                <a:schemeClr val="accent1">
+                  <a:lumMod val="75000"/>
+                </a:schemeClr>
+              </a:solidFill>
+              <a:latin typeface="Oxygen" panose="02000503000000000000" pitchFamily="2" charset="0"/>
+            </a:endParaRPr>
+          </a:p>
+          <a:p>
+            <a:r>
+              <a:rPr lang="en-US" sz="3000" dirty="0">
+                <a:solidFill>
+                  <a:schemeClr val="accent1">
+                    <a:lumMod val="75000"/>
+                  </a:schemeClr>
+                </a:solidFill>
+                <a:latin typeface="Oxygen" panose="02000503000000000000" pitchFamily="2" charset="0"/>
+              </a:rPr>
+              <a:t>&lt;This is an explanation of the different architecture entities in Trinity, not specific to an example&gt;</a:t>
+            </a:r>
+          </a:p>
+          <a:p>
+            <a:r>
+              <a:rPr lang="en-US" sz="3000" b="1" dirty="0">
+                <a:solidFill>
+                  <a:schemeClr val="accent1">
+                    <a:lumMod val="75000"/>
+                  </a:schemeClr>
+                </a:solidFill>
+                <a:latin typeface="Oxygen" panose="02000503000000000000" pitchFamily="2" charset="0"/>
+              </a:rPr>
+              <a:t>Component</a:t>
+            </a:r>
+          </a:p>
+          <a:p>
+            <a:r>
+              <a:rPr lang="en-US" sz="3000" b="1" dirty="0">
+                <a:solidFill>
+                  <a:schemeClr val="accent1">
+                    <a:lumMod val="75000"/>
+                  </a:schemeClr>
+                </a:solidFill>
+                <a:latin typeface="Oxygen" panose="02000503000000000000" pitchFamily="2" charset="0"/>
+              </a:rPr>
+              <a:t>Connector</a:t>
+            </a:r>
+          </a:p>
+          <a:p>
+            <a:r>
+              <a:rPr lang="en-US" sz="3000" b="1" dirty="0" err="1">
+                <a:solidFill>
+                  <a:schemeClr val="accent1">
+                    <a:lumMod val="75000"/>
+                  </a:schemeClr>
+                </a:solidFill>
+                <a:latin typeface="Oxygen" panose="02000503000000000000" pitchFamily="2" charset="0"/>
+              </a:rPr>
+              <a:t>entryPoints</a:t>
+            </a:r>
+            <a:r>
+              <a:rPr lang="en-US" sz="3000" b="1" dirty="0">
+                <a:solidFill>
+                  <a:schemeClr val="accent1">
+                    <a:lumMod val="75000"/>
+                  </a:schemeClr>
+                </a:solidFill>
+                <a:latin typeface="Oxygen" panose="02000503000000000000" pitchFamily="2" charset="0"/>
+              </a:rPr>
+              <a:t>(?)</a:t>
+            </a:r>
+          </a:p>
+          <a:p>
+            <a:endParaRPr lang="en-US" sz="3000" b="1" dirty="0">
+              <a:solidFill>
+                <a:schemeClr val="accent1">
+                  <a:lumMod val="75000"/>
+                </a:schemeClr>
+              </a:solidFill>
+              <a:latin typeface="Oxygen" panose="02000503000000000000" pitchFamily="2" charset="0"/>
+            </a:endParaRPr>
+          </a:p>
+        </p:txBody>
+      </p:sp>
+      <p:grpSp>
+        <p:nvGrpSpPr>
+          <p:cNvPr id="122" name="Group 121"/>
+          <p:cNvGrpSpPr/>
+          <p:nvPr/>
+        </p:nvGrpSpPr>
+        <p:grpSpPr>
+          <a:xfrm>
+            <a:off x="-820465" y="21233091"/>
+            <a:ext cx="8650551" cy="1477415"/>
+            <a:chOff x="-870930" y="22165668"/>
+            <a:chExt cx="9450261" cy="1723158"/>
+          </a:xfrm>
+        </p:grpSpPr>
+        <p:sp>
+          <p:nvSpPr>
+            <p:cNvPr id="120" name="Arrow: Chevron 119"/>
+            <p:cNvSpPr/>
+            <p:nvPr/>
+          </p:nvSpPr>
+          <p:spPr>
+            <a:xfrm rot="10800000">
+              <a:off x="-870930" y="22165668"/>
+              <a:ext cx="9450261" cy="1723158"/>
+            </a:xfrm>
+            <a:prstGeom prst="chevron">
+              <a:avLst/>
+            </a:prstGeom>
+            <a:ln>
+              <a:noFill/>
+            </a:ln>
+          </p:spPr>
+          <p:style>
+            <a:lnRef idx="2">
+              <a:schemeClr val="accent1">
+                <a:shade val="50000"/>
+              </a:schemeClr>
+            </a:lnRef>
+            <a:fillRef idx="1">
+              <a:schemeClr val="accent1"/>
+            </a:fillRef>
+            <a:effectRef idx="0">
+              <a:schemeClr val="accent1"/>
+            </a:effectRef>
+            <a:fontRef idx="minor">
+              <a:schemeClr val="lt1"/>
+            </a:fontRef>
+          </p:style>
+          <p:txBody>
+            <a:bodyPr rtlCol="0" anchor="ctr"/>
+            <a:lstStyle/>
+            <a:p>
+              <a:pPr algn="ctr"/>
+              <a:endParaRPr lang="en-US" sz="4000" dirty="0">
+                <a:solidFill>
+                  <a:schemeClr val="tx1"/>
+                </a:solidFill>
+                <a:latin typeface="Oxygen" panose="02000503000000000000" pitchFamily="2" charset="0"/>
+              </a:endParaRPr>
+            </a:p>
+          </p:txBody>
+        </p:sp>
+        <p:sp>
+          <p:nvSpPr>
+            <p:cNvPr id="121" name="TextBox 120"/>
+            <p:cNvSpPr txBox="1"/>
+            <p:nvPr/>
+          </p:nvSpPr>
+          <p:spPr>
+            <a:xfrm>
+              <a:off x="395115" y="22610693"/>
+              <a:ext cx="7258932" cy="825631"/>
+            </a:xfrm>
+            <a:prstGeom prst="rect">
+              <a:avLst/>
+            </a:prstGeom>
+            <a:noFill/>
+          </p:spPr>
+          <p:txBody>
+            <a:bodyPr wrap="square" rtlCol="0">
+              <a:spAutoFit/>
+            </a:bodyPr>
+            <a:lstStyle/>
+            <a:p>
+              <a:r>
+                <a:rPr lang="en-US" sz="4000" b="1" dirty="0">
+                  <a:solidFill>
+                    <a:schemeClr val="bg1">
+                      <a:lumMod val="85000"/>
+                    </a:schemeClr>
+                  </a:solidFill>
+                  <a:latin typeface="Oxygen" panose="02000503000000000000" pitchFamily="2" charset="0"/>
+                </a:rPr>
+                <a:t>Implementation Concepts</a:t>
+              </a:r>
+            </a:p>
+          </p:txBody>
+        </p:sp>
+      </p:grpSp>
+      <p:sp>
+        <p:nvSpPr>
+          <p:cNvPr id="123" name="TextBox 122"/>
+          <p:cNvSpPr txBox="1"/>
+          <p:nvPr/>
+        </p:nvSpPr>
+        <p:spPr>
+          <a:xfrm>
+            <a:off x="14499771" y="25307028"/>
+            <a:ext cx="8674536" cy="2862322"/>
+          </a:xfrm>
+          <a:prstGeom prst="rect">
+            <a:avLst/>
+          </a:prstGeom>
+          <a:noFill/>
+        </p:spPr>
+        <p:txBody>
+          <a:bodyPr wrap="square" rtlCol="0">
+            <a:spAutoFit/>
+          </a:bodyPr>
+          <a:lstStyle/>
+          <a:p>
+            <a:r>
+              <a:rPr lang="en-US" sz="3000" b="1" dirty="0">
+                <a:solidFill>
+                  <a:schemeClr val="accent1">
+                    <a:lumMod val="75000"/>
+                  </a:schemeClr>
+                </a:solidFill>
+                <a:latin typeface="Oxygen" panose="02000503000000000000" pitchFamily="2" charset="0"/>
+              </a:rPr>
+              <a:t>Demonstrated Principles</a:t>
+            </a:r>
+          </a:p>
+          <a:p>
+            <a:endParaRPr lang="en-US" sz="3000" b="1" dirty="0">
+              <a:solidFill>
+                <a:schemeClr val="accent1">
+                  <a:lumMod val="75000"/>
+                </a:schemeClr>
+              </a:solidFill>
+              <a:latin typeface="Oxygen" panose="02000503000000000000" pitchFamily="2" charset="0"/>
+            </a:endParaRPr>
+          </a:p>
+          <a:p>
+            <a:pPr marL="457200" indent="-457200">
+              <a:buFont typeface="Arial" panose="020B0604020202020204" pitchFamily="34" charset="0"/>
+              <a:buChar char="•"/>
+            </a:pPr>
+            <a:r>
+              <a:rPr lang="en-US" sz="3000" dirty="0">
+                <a:solidFill>
+                  <a:schemeClr val="accent1">
+                    <a:lumMod val="75000"/>
+                  </a:schemeClr>
+                </a:solidFill>
+                <a:latin typeface="Oxygen" panose="02000503000000000000" pitchFamily="2" charset="0"/>
+              </a:rPr>
+              <a:t>Readability</a:t>
+            </a:r>
+          </a:p>
+          <a:p>
+            <a:pPr marL="457200" indent="-457200">
+              <a:buFont typeface="Arial" panose="020B0604020202020204" pitchFamily="34" charset="0"/>
+              <a:buChar char="•"/>
+            </a:pPr>
+            <a:r>
+              <a:rPr lang="en-US" sz="3000" dirty="0">
+                <a:solidFill>
+                  <a:schemeClr val="accent1">
+                    <a:lumMod val="75000"/>
+                  </a:schemeClr>
+                </a:solidFill>
+                <a:latin typeface="Oxygen" panose="02000503000000000000" pitchFamily="2" charset="0"/>
+              </a:rPr>
+              <a:t>Reuse/adaptability</a:t>
+            </a:r>
+          </a:p>
+          <a:p>
+            <a:pPr marL="457200" indent="-457200">
+              <a:buFont typeface="Arial" panose="020B0604020202020204" pitchFamily="34" charset="0"/>
+              <a:buChar char="•"/>
+            </a:pPr>
+            <a:r>
+              <a:rPr lang="en-US" sz="3000" dirty="0">
+                <a:solidFill>
+                  <a:schemeClr val="accent1">
+                    <a:lumMod val="75000"/>
+                  </a:schemeClr>
+                </a:solidFill>
+                <a:latin typeface="Oxygen" panose="02000503000000000000" pitchFamily="2" charset="0"/>
+              </a:rPr>
+              <a:t>Communication integrity, especially in distributed systems</a:t>
+            </a:r>
+          </a:p>
+        </p:txBody>
+      </p:sp>
+      <p:sp>
+        <p:nvSpPr>
+          <p:cNvPr id="124" name="TextBox 123"/>
+          <p:cNvSpPr txBox="1"/>
+          <p:nvPr/>
+        </p:nvSpPr>
+        <p:spPr>
+          <a:xfrm>
+            <a:off x="1947327" y="34314058"/>
+            <a:ext cx="16903020" cy="3785652"/>
+          </a:xfrm>
+          <a:prstGeom prst="rect">
+            <a:avLst/>
+          </a:prstGeom>
+          <a:noFill/>
+        </p:spPr>
+        <p:txBody>
+          <a:bodyPr wrap="square" rtlCol="0">
+            <a:spAutoFit/>
+          </a:bodyPr>
+          <a:lstStyle/>
+          <a:p>
+            <a:r>
+              <a:rPr lang="en-US" sz="4000" b="1" dirty="0">
+                <a:solidFill>
+                  <a:srgbClr val="FEFCE8"/>
+                </a:solidFill>
+                <a:latin typeface="Oxygen" panose="02000503000000000000" pitchFamily="2" charset="0"/>
+              </a:rPr>
+              <a:t>&lt;INSERT EXAMPLE TRINITY CODE OF EXAMPLE ARCH.&gt;</a:t>
+            </a:r>
+          </a:p>
+          <a:p>
+            <a:r>
+              <a:rPr lang="en-US" sz="4000" b="1" dirty="0">
+                <a:solidFill>
+                  <a:srgbClr val="FEFCE8"/>
+                </a:solidFill>
+                <a:latin typeface="Oxygen" panose="02000503000000000000" pitchFamily="2" charset="0"/>
+              </a:rPr>
+              <a:t>	* describe each component</a:t>
+            </a:r>
+          </a:p>
+          <a:p>
+            <a:endParaRPr lang="en-US" sz="4000" b="1" dirty="0">
+              <a:solidFill>
+                <a:srgbClr val="FEFCE8"/>
+              </a:solidFill>
+              <a:latin typeface="Oxygen" panose="02000503000000000000" pitchFamily="2" charset="0"/>
+            </a:endParaRPr>
+          </a:p>
+          <a:p>
+            <a:r>
+              <a:rPr lang="en-US" sz="4000" b="1" dirty="0">
+                <a:solidFill>
+                  <a:srgbClr val="FEFCE8"/>
+                </a:solidFill>
+                <a:latin typeface="Oxygen" panose="02000503000000000000" pitchFamily="2" charset="0"/>
+              </a:rPr>
+              <a:t>&lt;INSERT SOFTWARE ARCHITECTURE DIAGRAM OF EXAMPLE&gt;</a:t>
+            </a:r>
+          </a:p>
+          <a:p>
+            <a:r>
+              <a:rPr lang="en-US" sz="4000" b="1" dirty="0">
+                <a:solidFill>
+                  <a:srgbClr val="FEFCE8"/>
+                </a:solidFill>
+                <a:latin typeface="Oxygen" panose="02000503000000000000" pitchFamily="2" charset="0"/>
+              </a:rPr>
+              <a:t>	</a:t>
+            </a:r>
+          </a:p>
+          <a:p>
+            <a:endParaRPr lang="en-US" sz="4000" b="1" dirty="0">
+              <a:solidFill>
+                <a:srgbClr val="FEFCE8"/>
+              </a:solidFill>
+              <a:latin typeface="Oxygen" panose="02000503000000000000" pitchFamily="2" charset="0"/>
+            </a:endParaRPr>
+          </a:p>
+        </p:txBody>
+      </p:sp>
     </p:spTree>
   </p:cSld>
   <p:clrMapOvr>

</xml_diff>

<commit_message>
Formatting and Arch Arrows
</commit_message>
<xml_diff>
--- a/CMU REUSE 2017 Poster.pptx
+++ b/CMU REUSE 2017 Poster.pptx
@@ -4916,188 +4916,6 @@
       </p:grpSp>
       <p:grpSp>
         <p:nvGrpSpPr>
-          <p:cNvPr id="11" name="Group 10"/>
-          <p:cNvGrpSpPr/>
-          <p:nvPr/>
-        </p:nvGrpSpPr>
-        <p:grpSpPr>
-          <a:xfrm>
-            <a:off x="10777675" y="9712796"/>
-            <a:ext cx="8040015" cy="9531531"/>
-            <a:chOff x="10921058" y="9151946"/>
-            <a:chExt cx="8040015" cy="9531531"/>
-          </a:xfrm>
-        </p:grpSpPr>
-        <p:sp>
-          <p:nvSpPr>
-            <p:cNvPr id="82" name="Oval 81"/>
-            <p:cNvSpPr/>
-            <p:nvPr/>
-          </p:nvSpPr>
-          <p:spPr>
-            <a:xfrm>
-              <a:off x="10921058" y="11254012"/>
-              <a:ext cx="8040015" cy="7429465"/>
-            </a:xfrm>
-            <a:prstGeom prst="ellipse">
-              <a:avLst/>
-            </a:prstGeom>
-            <a:solidFill>
-              <a:srgbClr val="CD6D6D">
-                <a:alpha val="13000"/>
-              </a:srgbClr>
-            </a:solidFill>
-            <a:ln>
-              <a:noFill/>
-            </a:ln>
-          </p:spPr>
-          <p:style>
-            <a:lnRef idx="2">
-              <a:schemeClr val="accent1">
-                <a:shade val="50000"/>
-              </a:schemeClr>
-            </a:lnRef>
-            <a:fillRef idx="1">
-              <a:schemeClr val="accent1"/>
-            </a:fillRef>
-            <a:effectRef idx="0">
-              <a:schemeClr val="accent1"/>
-            </a:effectRef>
-            <a:fontRef idx="minor">
-              <a:schemeClr val="lt1"/>
-            </a:fontRef>
-          </p:style>
-          <p:txBody>
-            <a:bodyPr rtlCol="0" anchor="ctr"/>
-            <a:lstStyle/>
-            <a:p>
-              <a:pPr algn="ctr"/>
-              <a:endParaRPr lang="en-US" dirty="0"/>
-            </a:p>
-          </p:txBody>
-        </p:sp>
-        <p:grpSp>
-          <p:nvGrpSpPr>
-            <p:cNvPr id="29" name="Group 28"/>
-            <p:cNvGrpSpPr/>
-            <p:nvPr/>
-          </p:nvGrpSpPr>
-          <p:grpSpPr>
-            <a:xfrm>
-              <a:off x="11114259" y="9151946"/>
-              <a:ext cx="5944661" cy="8096344"/>
-              <a:chOff x="12160993" y="8649848"/>
-              <a:chExt cx="5944661" cy="8096344"/>
-            </a:xfrm>
-          </p:grpSpPr>
-          <p:sp>
-            <p:nvSpPr>
-              <p:cNvPr id="70" name="Shape 70"/>
-              <p:cNvSpPr/>
-              <p:nvPr/>
-            </p:nvSpPr>
-            <p:spPr>
-              <a:xfrm>
-                <a:off x="12160993" y="9778349"/>
-                <a:ext cx="5944661" cy="6967843"/>
-              </a:xfrm>
-              <a:prstGeom prst="flowChartMagneticDisk">
-                <a:avLst/>
-              </a:prstGeom>
-              <a:noFill/>
-              <a:ln w="38100" cap="flat" cmpd="sng">
-                <a:solidFill>
-                  <a:srgbClr val="000000"/>
-                </a:solidFill>
-                <a:prstDash val="solid"/>
-                <a:round/>
-                <a:headEnd type="none" w="med" len="med"/>
-                <a:tailEnd type="none" w="med" len="med"/>
-              </a:ln>
-            </p:spPr>
-            <p:txBody>
-              <a:bodyPr lIns="91425" tIns="91425" rIns="91425" bIns="91425" anchor="ctr" anchorCtr="0">
-                <a:noAutofit/>
-              </a:bodyPr>
-              <a:lstStyle/>
-              <a:p>
-                <a:pPr lvl="0">
-                  <a:spcBef>
-                    <a:spcPts val="0"/>
-                  </a:spcBef>
-                  <a:buNone/>
-                </a:pPr>
-                <a:endParaRPr/>
-              </a:p>
-            </p:txBody>
-          </p:sp>
-          <p:sp>
-            <p:nvSpPr>
-              <p:cNvPr id="25" name="TextBox 24"/>
-              <p:cNvSpPr txBox="1"/>
-              <p:nvPr/>
-            </p:nvSpPr>
-            <p:spPr>
-              <a:xfrm>
-                <a:off x="12959152" y="8649848"/>
-                <a:ext cx="4067139" cy="861774"/>
-              </a:xfrm>
-              <a:prstGeom prst="rect">
-                <a:avLst/>
-              </a:prstGeom>
-              <a:noFill/>
-            </p:spPr>
-            <p:txBody>
-              <a:bodyPr wrap="none" rtlCol="0">
-                <a:spAutoFit/>
-              </a:bodyPr>
-              <a:lstStyle/>
-              <a:p>
-                <a:r>
-                  <a:rPr lang="en-US" sz="5000" b="1" dirty="0">
-                    <a:latin typeface="Oxygen" panose="02000503000000000000" pitchFamily="2" charset="0"/>
-                  </a:rPr>
-                  <a:t>The Problem</a:t>
-                </a:r>
-              </a:p>
-            </p:txBody>
-          </p:sp>
-          <p:sp>
-            <p:nvSpPr>
-              <p:cNvPr id="28" name="TextBox 27"/>
-              <p:cNvSpPr txBox="1"/>
-              <p:nvPr/>
-            </p:nvSpPr>
-            <p:spPr>
-              <a:xfrm>
-                <a:off x="12547735" y="12805877"/>
-                <a:ext cx="5171176" cy="2862322"/>
-              </a:xfrm>
-              <a:prstGeom prst="rect">
-                <a:avLst/>
-              </a:prstGeom>
-              <a:noFill/>
-            </p:spPr>
-            <p:txBody>
-              <a:bodyPr wrap="square" rtlCol="0">
-                <a:spAutoFit/>
-              </a:bodyPr>
-              <a:lstStyle/>
-              <a:p>
-                <a:pPr algn="ctr"/>
-                <a:r>
-                  <a:rPr lang="en-US" sz="3000" dirty="0">
-                    <a:latin typeface="Oxygen" panose="02000503000000000000" pitchFamily="2" charset="0"/>
-                  </a:rPr>
-                  <a:t>It is hard to determine whether the logical relationships between entities in architecture diagrams are present in system implementations. </a:t>
-                </a:r>
-              </a:p>
-            </p:txBody>
-          </p:sp>
-        </p:grpSp>
-      </p:grpSp>
-      <p:grpSp>
-        <p:nvGrpSpPr>
           <p:cNvPr id="66" name="Group 65"/>
           <p:cNvGrpSpPr/>
           <p:nvPr/>
@@ -5259,36 +5077,6 @@
             </a:endParaRPr>
           </a:p>
           <a:p>
-            <a:endParaRPr lang="en-US" sz="3200" b="1" dirty="0">
-              <a:solidFill>
-                <a:schemeClr val="tx2">
-                  <a:lumMod val="50000"/>
-                </a:schemeClr>
-              </a:solidFill>
-              <a:latin typeface="Oxygen" panose="02000503000000000000" pitchFamily="2" charset="0"/>
-            </a:endParaRPr>
-          </a:p>
-          <a:p>
-            <a:endParaRPr lang="en-US" sz="3200" b="1" dirty="0">
-              <a:solidFill>
-                <a:schemeClr val="tx2">
-                  <a:lumMod val="50000"/>
-                </a:schemeClr>
-              </a:solidFill>
-              <a:latin typeface="Oxygen" panose="02000503000000000000" pitchFamily="2" charset="0"/>
-            </a:endParaRPr>
-          </a:p>
-          <a:p>
-            <a:endParaRPr lang="en-US" sz="3200" b="1" dirty="0">
-              <a:solidFill>
-                <a:schemeClr val="tx2">
-                  <a:lumMod val="50000"/>
-                </a:schemeClr>
-              </a:solidFill>
-              <a:latin typeface="Oxygen" panose="02000503000000000000" pitchFamily="2" charset="0"/>
-            </a:endParaRPr>
-          </a:p>
-          <a:p>
             <a:r>
               <a:rPr lang="en-US" sz="3200" b="1" dirty="0">
                 <a:solidFill>
@@ -5602,48 +5390,6 @@
               </a:rPr>
               <a:t>  Lacks support for multiple architecture views; focuses only on Component-and-Connector view.</a:t>
             </a:r>
-          </a:p>
-          <a:p>
-            <a:pPr marL="457200" indent="-457200">
-              <a:buFont typeface="Arial" panose="020B0604020202020204" pitchFamily="34" charset="0"/>
-              <a:buChar char="•"/>
-            </a:pPr>
-            <a:endParaRPr lang="en-US" sz="2600" dirty="0">
-              <a:solidFill>
-                <a:schemeClr val="tx2">
-                  <a:lumMod val="50000"/>
-                </a:schemeClr>
-              </a:solidFill>
-              <a:latin typeface="Oxygen" panose="02000503000000000000" pitchFamily="2" charset="0"/>
-            </a:endParaRPr>
-          </a:p>
-          <a:p>
-            <a:pPr marL="457200" indent="-457200" algn="r">
-              <a:buFont typeface="Arial" panose="020B0604020202020204" pitchFamily="34" charset="0"/>
-              <a:buChar char="•"/>
-            </a:pPr>
-            <a:endParaRPr lang="en-US" sz="3200" b="1" dirty="0">
-              <a:solidFill>
-                <a:schemeClr val="tx2">
-                  <a:lumMod val="50000"/>
-                </a:schemeClr>
-              </a:solidFill>
-              <a:latin typeface="Oxygen" panose="02000503000000000000" pitchFamily="2" charset="0"/>
-            </a:endParaRPr>
-          </a:p>
-          <a:p>
-            <a:pPr marL="457200" indent="-457200">
-              <a:buFont typeface="Arial" panose="020B0604020202020204" pitchFamily="34" charset="0"/>
-              <a:buChar char="•"/>
-            </a:pPr>
-            <a:endParaRPr lang="en-US" sz="2600" dirty="0">
-              <a:solidFill>
-                <a:schemeClr val="tx2">
-                  <a:lumMod val="50000"/>
-                </a:schemeClr>
-              </a:solidFill>
-              <a:latin typeface="Oxygen" panose="02000503000000000000" pitchFamily="2" charset="0"/>
-            </a:endParaRPr>
           </a:p>
           <a:p>
             <a:pPr marL="457200" indent="-457200">
@@ -7961,9 +7707,6 @@
             <a:prstGeom prst="chevron">
               <a:avLst/>
             </a:prstGeom>
-            <a:ln>
-              <a:noFill/>
-            </a:ln>
           </p:spPr>
           <p:style>
             <a:lnRef idx="2">
@@ -8212,6 +7955,394 @@
           </a:p>
         </p:txBody>
       </p:sp>
+      <p:grpSp>
+        <p:nvGrpSpPr>
+          <p:cNvPr id="151" name="Group 150"/>
+          <p:cNvGrpSpPr/>
+          <p:nvPr/>
+        </p:nvGrpSpPr>
+        <p:grpSpPr>
+          <a:xfrm>
+            <a:off x="10777675" y="8831573"/>
+            <a:ext cx="8040015" cy="10412754"/>
+            <a:chOff x="10777675" y="8831573"/>
+            <a:chExt cx="8040015" cy="10412754"/>
+          </a:xfrm>
+        </p:grpSpPr>
+        <p:grpSp>
+          <p:nvGrpSpPr>
+            <p:cNvPr id="11" name="Group 10"/>
+            <p:cNvGrpSpPr/>
+            <p:nvPr/>
+          </p:nvGrpSpPr>
+          <p:grpSpPr>
+            <a:xfrm>
+              <a:off x="10777675" y="9712796"/>
+              <a:ext cx="8040015" cy="9531531"/>
+              <a:chOff x="10921058" y="9151946"/>
+              <a:chExt cx="8040015" cy="9531531"/>
+            </a:xfrm>
+          </p:grpSpPr>
+          <p:sp>
+            <p:nvSpPr>
+              <p:cNvPr id="82" name="Oval 81"/>
+              <p:cNvSpPr/>
+              <p:nvPr/>
+            </p:nvSpPr>
+            <p:spPr>
+              <a:xfrm>
+                <a:off x="10921058" y="11254012"/>
+                <a:ext cx="8040015" cy="7429465"/>
+              </a:xfrm>
+              <a:prstGeom prst="ellipse">
+                <a:avLst/>
+              </a:prstGeom>
+              <a:solidFill>
+                <a:srgbClr val="CD6D6D">
+                  <a:alpha val="13000"/>
+                </a:srgbClr>
+              </a:solidFill>
+              <a:ln>
+                <a:noFill/>
+              </a:ln>
+            </p:spPr>
+            <p:style>
+              <a:lnRef idx="2">
+                <a:schemeClr val="accent1">
+                  <a:shade val="50000"/>
+                </a:schemeClr>
+              </a:lnRef>
+              <a:fillRef idx="1">
+                <a:schemeClr val="accent1"/>
+              </a:fillRef>
+              <a:effectRef idx="0">
+                <a:schemeClr val="accent1"/>
+              </a:effectRef>
+              <a:fontRef idx="minor">
+                <a:schemeClr val="lt1"/>
+              </a:fontRef>
+            </p:style>
+            <p:txBody>
+              <a:bodyPr rtlCol="0" anchor="ctr"/>
+              <a:lstStyle/>
+              <a:p>
+                <a:pPr algn="ctr"/>
+                <a:endParaRPr lang="en-US" dirty="0"/>
+              </a:p>
+            </p:txBody>
+          </p:sp>
+          <p:grpSp>
+            <p:nvGrpSpPr>
+              <p:cNvPr id="29" name="Group 28"/>
+              <p:cNvGrpSpPr/>
+              <p:nvPr/>
+            </p:nvGrpSpPr>
+            <p:grpSpPr>
+              <a:xfrm>
+                <a:off x="11114259" y="9151946"/>
+                <a:ext cx="5944661" cy="8096344"/>
+                <a:chOff x="12160993" y="8649848"/>
+                <a:chExt cx="5944661" cy="8096344"/>
+              </a:xfrm>
+            </p:grpSpPr>
+            <p:sp>
+              <p:nvSpPr>
+                <p:cNvPr id="70" name="Shape 70"/>
+                <p:cNvSpPr/>
+                <p:nvPr/>
+              </p:nvSpPr>
+              <p:spPr>
+                <a:xfrm>
+                  <a:off x="12160993" y="9778349"/>
+                  <a:ext cx="5944661" cy="6967843"/>
+                </a:xfrm>
+                <a:prstGeom prst="flowChartMagneticDisk">
+                  <a:avLst/>
+                </a:prstGeom>
+                <a:noFill/>
+                <a:ln w="63500" cap="flat" cmpd="sng">
+                  <a:solidFill>
+                    <a:schemeClr val="tx2">
+                      <a:lumMod val="50000"/>
+                    </a:schemeClr>
+                  </a:solidFill>
+                  <a:prstDash val="solid"/>
+                  <a:round/>
+                  <a:headEnd type="none" w="med" len="med"/>
+                  <a:tailEnd type="none" w="med" len="med"/>
+                </a:ln>
+              </p:spPr>
+              <p:txBody>
+                <a:bodyPr lIns="91425" tIns="91425" rIns="91425" bIns="91425" anchor="ctr" anchorCtr="0">
+                  <a:noAutofit/>
+                </a:bodyPr>
+                <a:lstStyle/>
+                <a:p>
+                  <a:pPr lvl="0">
+                    <a:spcBef>
+                      <a:spcPts val="0"/>
+                    </a:spcBef>
+                    <a:buNone/>
+                  </a:pPr>
+                  <a:endParaRPr/>
+                </a:p>
+              </p:txBody>
+            </p:sp>
+            <p:sp>
+              <p:nvSpPr>
+                <p:cNvPr id="25" name="TextBox 24"/>
+                <p:cNvSpPr txBox="1"/>
+                <p:nvPr/>
+              </p:nvSpPr>
+              <p:spPr>
+                <a:xfrm>
+                  <a:off x="12959152" y="8649848"/>
+                  <a:ext cx="4067139" cy="861774"/>
+                </a:xfrm>
+                <a:prstGeom prst="rect">
+                  <a:avLst/>
+                </a:prstGeom>
+                <a:noFill/>
+              </p:spPr>
+              <p:txBody>
+                <a:bodyPr wrap="none" rtlCol="0">
+                  <a:spAutoFit/>
+                </a:bodyPr>
+                <a:lstStyle/>
+                <a:p>
+                  <a:r>
+                    <a:rPr lang="en-US" sz="5000" b="1" dirty="0">
+                      <a:solidFill>
+                        <a:schemeClr val="tx2">
+                          <a:lumMod val="50000"/>
+                        </a:schemeClr>
+                      </a:solidFill>
+                      <a:latin typeface="Oxygen" panose="02000503000000000000" pitchFamily="2" charset="0"/>
+                    </a:rPr>
+                    <a:t>The Problem</a:t>
+                  </a:r>
+                </a:p>
+              </p:txBody>
+            </p:sp>
+            <p:sp>
+              <p:nvSpPr>
+                <p:cNvPr id="28" name="TextBox 27"/>
+                <p:cNvSpPr txBox="1"/>
+                <p:nvPr/>
+              </p:nvSpPr>
+              <p:spPr>
+                <a:xfrm>
+                  <a:off x="12547735" y="12805877"/>
+                  <a:ext cx="5171176" cy="2862322"/>
+                </a:xfrm>
+                <a:prstGeom prst="rect">
+                  <a:avLst/>
+                </a:prstGeom>
+                <a:noFill/>
+              </p:spPr>
+              <p:txBody>
+                <a:bodyPr wrap="square" rtlCol="0">
+                  <a:spAutoFit/>
+                </a:bodyPr>
+                <a:lstStyle/>
+                <a:p>
+                  <a:pPr algn="ctr"/>
+                  <a:r>
+                    <a:rPr lang="en-US" sz="3000" dirty="0">
+                      <a:solidFill>
+                        <a:schemeClr val="tx2">
+                          <a:lumMod val="50000"/>
+                        </a:schemeClr>
+                      </a:solidFill>
+                      <a:latin typeface="Oxygen" panose="02000503000000000000" pitchFamily="2" charset="0"/>
+                    </a:rPr>
+                    <a:t>It is hard to determine whether the logical relationships between entities in architecture diagrams are present in system implementations. </a:t>
+                  </a:r>
+                </a:p>
+              </p:txBody>
+            </p:sp>
+          </p:grpSp>
+        </p:grpSp>
+        <p:grpSp>
+          <p:nvGrpSpPr>
+            <p:cNvPr id="150" name="Group 149"/>
+            <p:cNvGrpSpPr/>
+            <p:nvPr/>
+          </p:nvGrpSpPr>
+          <p:grpSpPr>
+            <a:xfrm>
+              <a:off x="16915536" y="8831573"/>
+              <a:ext cx="1035580" cy="5795245"/>
+              <a:chOff x="16915536" y="8831573"/>
+              <a:chExt cx="1035580" cy="5795245"/>
+            </a:xfrm>
+          </p:grpSpPr>
+          <p:cxnSp>
+            <p:nvCxnSpPr>
+              <p:cNvPr id="130" name="Connector: Elbow 129"/>
+              <p:cNvCxnSpPr/>
+              <p:nvPr/>
+            </p:nvCxnSpPr>
+            <p:spPr>
+              <a:xfrm rot="5400000" flipH="1" flipV="1">
+                <a:off x="14318464" y="11443826"/>
+                <a:ext cx="5780064" cy="585920"/>
+              </a:xfrm>
+              <a:prstGeom prst="bentConnector3">
+                <a:avLst>
+                  <a:gd name="adj1" fmla="val 563"/>
+                </a:avLst>
+              </a:prstGeom>
+              <a:ln w="63500">
+                <a:solidFill>
+                  <a:schemeClr val="tx2">
+                    <a:lumMod val="50000"/>
+                  </a:schemeClr>
+                </a:solidFill>
+                <a:tailEnd type="none"/>
+              </a:ln>
+            </p:spPr>
+            <p:style>
+              <a:lnRef idx="1">
+                <a:schemeClr val="accent1"/>
+              </a:lnRef>
+              <a:fillRef idx="0">
+                <a:schemeClr val="accent1"/>
+              </a:fillRef>
+              <a:effectRef idx="0">
+                <a:schemeClr val="accent1"/>
+              </a:effectRef>
+              <a:fontRef idx="minor">
+                <a:schemeClr val="tx1"/>
+              </a:fontRef>
+            </p:style>
+          </p:cxnSp>
+          <p:cxnSp>
+            <p:nvCxnSpPr>
+              <p:cNvPr id="140" name="Straight Arrow Connector 139"/>
+              <p:cNvCxnSpPr/>
+              <p:nvPr/>
+            </p:nvCxnSpPr>
+            <p:spPr>
+              <a:xfrm flipV="1">
+                <a:off x="17501456" y="8846754"/>
+                <a:ext cx="449660" cy="12914"/>
+              </a:xfrm>
+              <a:prstGeom prst="straightConnector1">
+                <a:avLst/>
+              </a:prstGeom>
+              <a:ln w="63500">
+                <a:solidFill>
+                  <a:schemeClr val="tx2">
+                    <a:lumMod val="50000"/>
+                  </a:schemeClr>
+                </a:solidFill>
+                <a:tailEnd type="stealth" w="lg" len="lg"/>
+              </a:ln>
+            </p:spPr>
+            <p:style>
+              <a:lnRef idx="1">
+                <a:schemeClr val="accent1"/>
+              </a:lnRef>
+              <a:fillRef idx="0">
+                <a:schemeClr val="accent1"/>
+              </a:fillRef>
+              <a:effectRef idx="0">
+                <a:schemeClr val="accent1"/>
+              </a:effectRef>
+              <a:fontRef idx="minor">
+                <a:schemeClr val="tx1"/>
+              </a:fontRef>
+            </p:style>
+          </p:cxnSp>
+          <p:sp>
+            <p:nvSpPr>
+              <p:cNvPr id="149" name="Flowchart: Connector 148"/>
+              <p:cNvSpPr/>
+              <p:nvPr/>
+            </p:nvSpPr>
+            <p:spPr>
+              <a:xfrm>
+                <a:off x="17474310" y="8831573"/>
+                <a:ext cx="45719" cy="45719"/>
+              </a:xfrm>
+              <a:prstGeom prst="flowChartConnector">
+                <a:avLst/>
+              </a:prstGeom>
+              <a:solidFill>
+                <a:schemeClr val="tx2">
+                  <a:lumMod val="50000"/>
+                </a:schemeClr>
+              </a:solidFill>
+              <a:ln>
+                <a:noFill/>
+              </a:ln>
+            </p:spPr>
+            <p:style>
+              <a:lnRef idx="2">
+                <a:schemeClr val="accent1">
+                  <a:shade val="50000"/>
+                </a:schemeClr>
+              </a:lnRef>
+              <a:fillRef idx="1">
+                <a:schemeClr val="accent1"/>
+              </a:fillRef>
+              <a:effectRef idx="0">
+                <a:schemeClr val="accent1"/>
+              </a:effectRef>
+              <a:fontRef idx="minor">
+                <a:schemeClr val="lt1"/>
+              </a:fontRef>
+            </p:style>
+            <p:txBody>
+              <a:bodyPr rtlCol="0" anchor="ctr"/>
+              <a:lstStyle/>
+              <a:p>
+                <a:pPr algn="ctr"/>
+                <a:endParaRPr lang="en-US"/>
+              </a:p>
+            </p:txBody>
+          </p:sp>
+        </p:grpSp>
+      </p:grpSp>
+      <p:cxnSp>
+        <p:nvCxnSpPr>
+          <p:cNvPr id="153" name="Straight Arrow Connector 152"/>
+          <p:cNvCxnSpPr/>
+          <p:nvPr/>
+        </p:nvCxnSpPr>
+        <p:spPr>
+          <a:xfrm>
+            <a:off x="20718379" y="12254477"/>
+            <a:ext cx="0" cy="1171005"/>
+          </a:xfrm>
+          <a:prstGeom prst="straightConnector1">
+            <a:avLst/>
+          </a:prstGeom>
+          <a:ln w="63500">
+            <a:solidFill>
+              <a:schemeClr val="tx2">
+                <a:lumMod val="50000"/>
+              </a:schemeClr>
+            </a:solidFill>
+            <a:tailEnd type="stealth" w="lg" len="lg"/>
+          </a:ln>
+        </p:spPr>
+        <p:style>
+          <a:lnRef idx="1">
+            <a:schemeClr val="accent1"/>
+          </a:lnRef>
+          <a:fillRef idx="0">
+            <a:schemeClr val="accent1"/>
+          </a:fillRef>
+          <a:effectRef idx="0">
+            <a:schemeClr val="accent1"/>
+          </a:effectRef>
+          <a:fontRef idx="minor">
+            <a:schemeClr val="tx1"/>
+          </a:fontRef>
+        </p:style>
+      </p:cxnSp>
     </p:spTree>
   </p:cSld>
   <p:clrMapOvr>

</xml_diff>